<commit_message>
update slides with a file info slide
</commit_message>
<xml_diff>
--- a/docs/ADF.pptx
+++ b/docs/ADF.pptx
@@ -5,10 +5,10 @@
     <p:sldMasterId id="2147483660" r:id="rId4"/>
   </p:sldMasterIdLst>
   <p:notesMasterIdLst>
-    <p:notesMasterId r:id="rId15"/>
+    <p:notesMasterId r:id="rId16"/>
   </p:notesMasterIdLst>
   <p:handoutMasterIdLst>
-    <p:handoutMasterId r:id="rId16"/>
+    <p:handoutMasterId r:id="rId17"/>
   </p:handoutMasterIdLst>
   <p:sldIdLst>
     <p:sldId id="256" r:id="rId5"/>
@@ -16,11 +16,12 @@
     <p:sldId id="258" r:id="rId7"/>
     <p:sldId id="259" r:id="rId8"/>
     <p:sldId id="268" r:id="rId9"/>
-    <p:sldId id="267" r:id="rId10"/>
-    <p:sldId id="260" r:id="rId11"/>
-    <p:sldId id="265" r:id="rId12"/>
-    <p:sldId id="269" r:id="rId13"/>
-    <p:sldId id="270" r:id="rId14"/>
+    <p:sldId id="271" r:id="rId10"/>
+    <p:sldId id="267" r:id="rId11"/>
+    <p:sldId id="260" r:id="rId12"/>
+    <p:sldId id="265" r:id="rId13"/>
+    <p:sldId id="269" r:id="rId14"/>
+    <p:sldId id="270" r:id="rId15"/>
   </p:sldIdLst>
   <p:sldSz cx="12188825" cy="6858000"/>
   <p:notesSz cx="6858000" cy="9144000"/>
@@ -3956,7 +3957,7 @@
           <a:p>
             <a:fld id="{AC8CEC3D-96F7-401F-9673-3EE7F75C9C5B}" type="datetimeFigureOut">
               <a:rPr lang="en-US"/>
-              <a:t>10/17/2020</a:t>
+              <a:t>12/10/2020</a:t>
             </a:fld>
             <a:endParaRPr dirty="0"/>
           </a:p>
@@ -4175,7 +4176,7 @@
           <a:p>
             <a:fld id="{F032BCF4-D26D-4DAF-9F57-FE1E61FE7935}" type="datetimeFigureOut">
               <a:rPr lang="en-US"/>
-              <a:t>10/17/2020</a:t>
+              <a:t>12/10/2020</a:t>
             </a:fld>
             <a:endParaRPr dirty="0"/>
           </a:p>
@@ -4918,7 +4919,7 @@
           <a:p>
             <a:fld id="{DAD2365B-5397-4552-89D2-3C31D6B894C4}" type="datetime1">
               <a:rPr lang="en-US" smtClean="0"/>
-              <a:t>10/17/2020</a:t>
+              <a:t>12/10/2020</a:t>
             </a:fld>
             <a:endParaRPr lang="en-US" dirty="0"/>
           </a:p>
@@ -5147,7 +5148,7 @@
           <a:p>
             <a:fld id="{3718D474-84CF-40A5-B032-DFFDE135438A}" type="datetime1">
               <a:rPr lang="en-US" smtClean="0"/>
-              <a:t>10/17/2020</a:t>
+              <a:t>12/10/2020</a:t>
             </a:fld>
             <a:endParaRPr lang="en-US" dirty="0"/>
           </a:p>
@@ -5369,7 +5370,7 @@
           <a:p>
             <a:fld id="{7067C6EF-6B90-465F-AC36-47BDECADBD65}" type="datetime1">
               <a:rPr lang="en-US" smtClean="0"/>
-              <a:t>10/17/2020</a:t>
+              <a:t>12/10/2020</a:t>
             </a:fld>
             <a:endParaRPr lang="en-US" dirty="0"/>
           </a:p>
@@ -5586,7 +5587,7 @@
           <a:p>
             <a:fld id="{ED1E4A86-2703-4937-ABF7-D8FBDB5C3D3E}" type="datetime1">
               <a:rPr lang="en-US" smtClean="0"/>
-              <a:t>10/17/2020</a:t>
+              <a:t>12/10/2020</a:t>
             </a:fld>
             <a:endParaRPr lang="en-US" dirty="0"/>
           </a:p>
@@ -5852,7 +5853,7 @@
           <a:p>
             <a:fld id="{12E02F23-BD92-4B7B-9DFF-42EEC8F21ED4}" type="datetime1">
               <a:rPr lang="en-US" smtClean="0"/>
-              <a:t>10/17/2020</a:t>
+              <a:t>12/10/2020</a:t>
             </a:fld>
             <a:endParaRPr lang="en-US" dirty="0"/>
           </a:p>
@@ -6154,7 +6155,7 @@
           <a:p>
             <a:fld id="{8814B7EA-8738-442B-ADC7-3A7E6F5C49CD}" type="datetime1">
               <a:rPr lang="en-US" smtClean="0"/>
-              <a:t>10/17/2020</a:t>
+              <a:t>12/10/2020</a:t>
             </a:fld>
             <a:endParaRPr lang="en-US" dirty="0"/>
           </a:p>
@@ -6604,7 +6605,7 @@
           <a:p>
             <a:fld id="{8FE5692D-78A6-499F-901A-E660774CC8EE}" type="datetime1">
               <a:rPr lang="en-US" smtClean="0"/>
-              <a:t>10/17/2020</a:t>
+              <a:t>12/10/2020</a:t>
             </a:fld>
             <a:endParaRPr lang="en-US" dirty="0"/>
           </a:p>
@@ -6737,7 +6738,7 @@
           <a:p>
             <a:fld id="{6776F355-F21B-43C0-ABBD-B5AEBBE279A6}" type="datetime1">
               <a:rPr lang="en-US" smtClean="0"/>
-              <a:t>10/17/2020</a:t>
+              <a:t>12/10/2020</a:t>
             </a:fld>
             <a:endParaRPr lang="en-US" dirty="0"/>
           </a:p>
@@ -6847,7 +6848,7 @@
           <a:p>
             <a:fld id="{C0AB95E7-F437-40FB-91EE-0B08B57CB523}" type="datetime1">
               <a:rPr lang="en-US" smtClean="0"/>
-              <a:t>10/17/2020</a:t>
+              <a:t>12/10/2020</a:t>
             </a:fld>
             <a:endParaRPr lang="en-US" dirty="0"/>
           </a:p>
@@ -7147,7 +7148,7 @@
           <a:p>
             <a:fld id="{67709EEF-87D9-4049-9A5D-A2B5E4C83A85}" type="datetime1">
               <a:rPr lang="en-US" smtClean="0"/>
-              <a:t>10/17/2020</a:t>
+              <a:t>12/10/2020</a:t>
             </a:fld>
             <a:endParaRPr lang="en-US" dirty="0"/>
           </a:p>
@@ -7436,7 +7437,7 @@
           <a:p>
             <a:fld id="{CAEBD992-82F2-4752-BCD7-4BDCCFA26099}" type="datetime1">
               <a:rPr lang="en-US" smtClean="0"/>
-              <a:t>10/17/2020</a:t>
+              <a:t>12/10/2020</a:t>
             </a:fld>
             <a:endParaRPr lang="en-US" dirty="0"/>
           </a:p>
@@ -7734,7 +7735,7 @@
             <a:fld id="{7590C4DA-EDE6-465C-B91D-0B6D7078AFBA}" type="datetime1">
               <a:rPr lang="en-US" smtClean="0"/>
               <a:pPr/>
-              <a:t>10/17/2020</a:t>
+              <a:t>12/10/2020</a:t>
             </a:fld>
             <a:endParaRPr lang="en-US" dirty="0"/>
           </a:p>
@@ -8314,2030 +8315,6 @@
 </file>
 
 <file path=ppt/slides/slide10.xml><?xml version="1.0" encoding="utf-8"?>
-<p:sld xmlns:a="http://schemas.openxmlformats.org/drawingml/2006/main" xmlns:r="http://schemas.openxmlformats.org/officeDocument/2006/relationships" xmlns:p="http://schemas.openxmlformats.org/presentationml/2006/main">
-  <p:cSld>
-    <p:spTree>
-      <p:nvGrpSpPr>
-        <p:cNvPr id="1" name=""/>
-        <p:cNvGrpSpPr/>
-        <p:nvPr/>
-      </p:nvGrpSpPr>
-      <p:grpSpPr>
-        <a:xfrm>
-          <a:off x="0" y="0"/>
-          <a:ext cx="0" cy="0"/>
-          <a:chOff x="0" y="0"/>
-          <a:chExt cx="0" cy="0"/>
-        </a:xfrm>
-      </p:grpSpPr>
-      <p:sp>
-        <p:nvSpPr>
-          <p:cNvPr id="2" name="Title 1"/>
-          <p:cNvSpPr>
-            <a:spLocks noGrp="1"/>
-          </p:cNvSpPr>
-          <p:nvPr>
-            <p:ph type="title"/>
-          </p:nvPr>
-        </p:nvSpPr>
-        <p:spPr>
-          <a:xfrm>
-            <a:off x="455612" y="5257800"/>
-            <a:ext cx="10971372" cy="1066800"/>
-          </a:xfrm>
-        </p:spPr>
-        <p:txBody>
-          <a:bodyPr/>
-          <a:lstStyle/>
-          <a:p>
-            <a:r>
-              <a:rPr lang="en-US" dirty="0"/>
-              <a:t>Questions?</a:t>
-            </a:r>
-          </a:p>
-        </p:txBody>
-      </p:sp>
-      <p:sp>
-        <p:nvSpPr>
-          <p:cNvPr id="3" name="Content Placeholder 2"/>
-          <p:cNvSpPr>
-            <a:spLocks noGrp="1"/>
-          </p:cNvSpPr>
-          <p:nvPr>
-            <p:ph sz="half" idx="1"/>
-          </p:nvPr>
-        </p:nvSpPr>
-        <p:spPr>
-          <a:xfrm>
-            <a:off x="609440" y="685800"/>
-            <a:ext cx="9828372" cy="5029200"/>
-          </a:xfrm>
-        </p:spPr>
-        <p:txBody>
-          <a:bodyPr>
-            <a:normAutofit/>
-          </a:bodyPr>
-          <a:lstStyle/>
-          <a:p>
-            <a:pPr marL="0" indent="0">
-              <a:buNone/>
-            </a:pPr>
-            <a:r>
-              <a:rPr lang="en-US" dirty="0"/>
-              <a:t>Links</a:t>
-            </a:r>
-          </a:p>
-          <a:p>
-            <a:pPr>
-              <a:buFontTx/>
-              <a:buChar char="-"/>
-            </a:pPr>
-            <a:r>
-              <a:rPr lang="en-US" dirty="0"/>
-              <a:t>Sample projects</a:t>
-            </a:r>
-          </a:p>
-          <a:p>
-            <a:pPr lvl="1">
-              <a:buFontTx/>
-              <a:buChar char="-"/>
-            </a:pPr>
-            <a:r>
-              <a:rPr lang="en-US" dirty="0"/>
-              <a:t>https://github.com/brwilkinson/AzureDeploymentFramework</a:t>
-            </a:r>
-          </a:p>
-          <a:p>
-            <a:pPr>
-              <a:buFontTx/>
-              <a:buChar char="-"/>
-            </a:pPr>
-            <a:r>
-              <a:rPr lang="en-US" dirty="0"/>
-              <a:t>Template Information</a:t>
-            </a:r>
-          </a:p>
-          <a:p>
-            <a:pPr lvl="1">
-              <a:buFontTx/>
-              <a:buChar char="-"/>
-            </a:pPr>
-            <a:r>
-              <a:rPr lang="en-US" dirty="0">
-                <a:hlinkClick r:id="rId2"/>
-              </a:rPr>
-              <a:t>https://docs.microsoft.com/en-us/azure/templates/</a:t>
-            </a:r>
-            <a:r>
-              <a:rPr lang="en-US" dirty="0"/>
-              <a:t> </a:t>
-            </a:r>
-          </a:p>
-          <a:p>
-            <a:pPr>
-              <a:buFontTx/>
-              <a:buChar char="-"/>
-            </a:pPr>
-            <a:r>
-              <a:rPr lang="en-US" dirty="0"/>
-              <a:t>Feel free to reach out directly for other private projects</a:t>
-            </a:r>
-          </a:p>
-          <a:p>
-            <a:pPr lvl="1">
-              <a:buFontTx/>
-              <a:buChar char="-"/>
-            </a:pPr>
-            <a:r>
-              <a:rPr lang="en-US" dirty="0"/>
-              <a:t>Assistance with Templates /  DSC / PowerShell</a:t>
-            </a:r>
-          </a:p>
-          <a:p>
-            <a:pPr>
-              <a:buFontTx/>
-              <a:buChar char="-"/>
-            </a:pPr>
-            <a:r>
-              <a:rPr lang="en-US" dirty="0"/>
-              <a:t>All feedback is welcome . . . The ADF is always changing. </a:t>
-            </a:r>
-          </a:p>
-          <a:p>
-            <a:pPr>
-              <a:buFontTx/>
-              <a:buChar char="-"/>
-            </a:pPr>
-            <a:endParaRPr lang="en-US" dirty="0"/>
-          </a:p>
-          <a:p>
-            <a:pPr>
-              <a:buFontTx/>
-              <a:buChar char="-"/>
-            </a:pPr>
-            <a:endParaRPr lang="en-US" dirty="0"/>
-          </a:p>
-        </p:txBody>
-      </p:sp>
-    </p:spTree>
-    <p:extLst>
-      <p:ext uri="{BB962C8B-B14F-4D97-AF65-F5344CB8AC3E}">
-        <p14:creationId xmlns:p14="http://schemas.microsoft.com/office/powerpoint/2010/main" val="1280870235"/>
-      </p:ext>
-    </p:extLst>
-  </p:cSld>
-  <p:clrMapOvr>
-    <a:masterClrMapping/>
-  </p:clrMapOvr>
-  <mc:AlternateContent xmlns:mc="http://schemas.openxmlformats.org/markup-compatibility/2006" xmlns:p14="http://schemas.microsoft.com/office/powerpoint/2010/main">
-    <mc:Choice Requires="p14">
-      <p:transition spd="med" p14:dur="700">
-        <p:fade/>
-      </p:transition>
-    </mc:Choice>
-    <mc:Fallback xmlns="">
-      <p:transition spd="med">
-        <p:fade/>
-      </p:transition>
-    </mc:Fallback>
-  </mc:AlternateContent>
-</p:sld>
-</file>
-
-<file path=ppt/slides/slide2.xml><?xml version="1.0" encoding="utf-8"?>
-<p:sld xmlns:a="http://schemas.openxmlformats.org/drawingml/2006/main" xmlns:r="http://schemas.openxmlformats.org/officeDocument/2006/relationships" xmlns:p="http://schemas.openxmlformats.org/presentationml/2006/main">
-  <p:cSld>
-    <p:spTree>
-      <p:nvGrpSpPr>
-        <p:cNvPr id="1" name=""/>
-        <p:cNvGrpSpPr/>
-        <p:nvPr/>
-      </p:nvGrpSpPr>
-      <p:grpSpPr>
-        <a:xfrm>
-          <a:off x="0" y="0"/>
-          <a:ext cx="0" cy="0"/>
-          <a:chOff x="0" y="0"/>
-          <a:chExt cx="0" cy="0"/>
-        </a:xfrm>
-      </p:grpSpPr>
-      <p:sp>
-        <p:nvSpPr>
-          <p:cNvPr id="2" name="Title 1"/>
-          <p:cNvSpPr>
-            <a:spLocks noGrp="1"/>
-          </p:cNvSpPr>
-          <p:nvPr>
-            <p:ph type="title"/>
-          </p:nvPr>
-        </p:nvSpPr>
-        <p:spPr/>
-        <p:txBody>
-          <a:bodyPr/>
-          <a:lstStyle/>
-          <a:p>
-            <a:r>
-              <a:rPr lang="en-US" dirty="0"/>
-              <a:t>What is ADF?</a:t>
-            </a:r>
-          </a:p>
-        </p:txBody>
-      </p:sp>
-      <p:sp>
-        <p:nvSpPr>
-          <p:cNvPr id="3" name="Content Placeholder 2"/>
-          <p:cNvSpPr>
-            <a:spLocks noGrp="1"/>
-          </p:cNvSpPr>
-          <p:nvPr>
-            <p:ph idx="13"/>
-          </p:nvPr>
-        </p:nvSpPr>
-        <p:spPr>
-          <a:xfrm>
-            <a:off x="1293812" y="685801"/>
-            <a:ext cx="10287000" cy="4800599"/>
-          </a:xfrm>
-        </p:spPr>
-        <p:txBody>
-          <a:bodyPr>
-            <a:normAutofit/>
-          </a:bodyPr>
-          <a:lstStyle/>
-          <a:p>
-            <a:r>
-              <a:rPr lang="en-US" dirty="0"/>
-              <a:t>A </a:t>
-            </a:r>
-            <a:r>
-              <a:rPr lang="en-US" dirty="0">
-                <a:solidFill>
-                  <a:srgbClr val="7030A0"/>
-                </a:solidFill>
-              </a:rPr>
-              <a:t>declarative</a:t>
-            </a:r>
-            <a:r>
-              <a:rPr lang="en-US" dirty="0"/>
-              <a:t> way to build Cloud Infrastructure and Services.</a:t>
-            </a:r>
-          </a:p>
-          <a:p>
-            <a:r>
-              <a:rPr lang="en-US" dirty="0"/>
-              <a:t>Combines two common </a:t>
-            </a:r>
-            <a:r>
-              <a:rPr lang="en-US" dirty="0">
-                <a:solidFill>
-                  <a:srgbClr val="7030A0"/>
-                </a:solidFill>
-              </a:rPr>
-              <a:t>idempotent</a:t>
-            </a:r>
-            <a:r>
-              <a:rPr lang="en-US" dirty="0"/>
-              <a:t> technologies for Automation</a:t>
-            </a:r>
-          </a:p>
-          <a:p>
-            <a:r>
-              <a:rPr lang="en-US" dirty="0">
-                <a:solidFill>
-                  <a:srgbClr val="7030A0"/>
-                </a:solidFill>
-              </a:rPr>
-              <a:t>Infrastructure</a:t>
-            </a:r>
-            <a:r>
-              <a:rPr lang="en-US" dirty="0"/>
-              <a:t> as Code:</a:t>
-            </a:r>
-          </a:p>
-          <a:p>
-            <a:pPr lvl="1"/>
-            <a:r>
-              <a:rPr lang="en-US" dirty="0"/>
-              <a:t>Azure Resource Manager (</a:t>
-            </a:r>
-            <a:r>
-              <a:rPr lang="en-US" b="1" dirty="0"/>
-              <a:t>ARM</a:t>
-            </a:r>
-            <a:r>
-              <a:rPr lang="en-US" dirty="0"/>
-              <a:t>) Deployment Templates</a:t>
-            </a:r>
-          </a:p>
-          <a:p>
-            <a:pPr marL="228600" lvl="1" indent="-228600">
-              <a:spcBef>
-                <a:spcPts val="1800"/>
-              </a:spcBef>
-              <a:buClr>
-                <a:schemeClr val="tx1"/>
-              </a:buClr>
-              <a:buFont typeface="Arial" pitchFamily="34" charset="0"/>
-              <a:buChar char="•"/>
-            </a:pPr>
-            <a:r>
-              <a:rPr lang="en-US" sz="2800" dirty="0">
-                <a:solidFill>
-                  <a:srgbClr val="7030A0"/>
-                </a:solidFill>
-              </a:rPr>
-              <a:t>Configuration</a:t>
-            </a:r>
-            <a:r>
-              <a:rPr lang="en-US" sz="2800" dirty="0"/>
-              <a:t> as Code:</a:t>
-            </a:r>
-          </a:p>
-          <a:p>
-            <a:pPr lvl="1"/>
-            <a:r>
-              <a:rPr lang="en-US" dirty="0"/>
-              <a:t>PowerShell Desired State Configuration (</a:t>
-            </a:r>
-            <a:r>
-              <a:rPr lang="en-US" b="1" dirty="0"/>
-              <a:t>DSC</a:t>
-            </a:r>
-            <a:r>
-              <a:rPr lang="en-US" dirty="0"/>
-              <a:t>)</a:t>
-            </a:r>
-          </a:p>
-          <a:p>
-            <a:pPr marL="228600" lvl="1" indent="-228600">
-              <a:spcBef>
-                <a:spcPts val="1800"/>
-              </a:spcBef>
-              <a:buClr>
-                <a:schemeClr val="tx1"/>
-              </a:buClr>
-              <a:buFont typeface="Arial" pitchFamily="34" charset="0"/>
-              <a:buChar char="•"/>
-            </a:pPr>
-            <a:r>
-              <a:rPr lang="en-US" sz="2800" dirty="0"/>
-              <a:t>Follows a DevOps mindset for Deployment</a:t>
-            </a:r>
-          </a:p>
-          <a:p>
-            <a:pPr marL="228600" lvl="1" indent="-228600">
-              <a:spcBef>
-                <a:spcPts val="1800"/>
-              </a:spcBef>
-              <a:buClr>
-                <a:schemeClr val="tx1"/>
-              </a:buClr>
-              <a:buFont typeface="Arial" pitchFamily="34" charset="0"/>
-              <a:buChar char="•"/>
-            </a:pPr>
-            <a:r>
-              <a:rPr lang="en-US" sz="2800" dirty="0"/>
-              <a:t>Useful for </a:t>
-            </a:r>
-            <a:r>
-              <a:rPr lang="en-US" sz="2800" b="1" dirty="0"/>
-              <a:t>IaaS</a:t>
-            </a:r>
-            <a:r>
-              <a:rPr lang="en-US" sz="2800" dirty="0"/>
-              <a:t> </a:t>
-            </a:r>
-            <a:r>
-              <a:rPr lang="en-US" sz="2800" dirty="0">
-                <a:solidFill>
-                  <a:srgbClr val="7030A0"/>
-                </a:solidFill>
-              </a:rPr>
-              <a:t>or</a:t>
-            </a:r>
-            <a:r>
-              <a:rPr lang="en-US" sz="2800" dirty="0"/>
-              <a:t> </a:t>
-            </a:r>
-            <a:r>
-              <a:rPr lang="en-US" sz="2800" b="1" dirty="0"/>
-              <a:t>PaaS</a:t>
-            </a:r>
-            <a:r>
-              <a:rPr lang="en-US" sz="2800" dirty="0"/>
-              <a:t> services </a:t>
-            </a:r>
-            <a:r>
-              <a:rPr lang="en-US" sz="2800" dirty="0">
-                <a:solidFill>
-                  <a:srgbClr val="7030A0"/>
-                </a:solidFill>
-              </a:rPr>
-              <a:t>+</a:t>
-            </a:r>
-            <a:r>
-              <a:rPr lang="en-US" sz="2800" dirty="0"/>
-              <a:t> monitoring </a:t>
-            </a:r>
-            <a:r>
-              <a:rPr lang="en-US" sz="2800" dirty="0">
-                <a:solidFill>
-                  <a:srgbClr val="7030A0"/>
-                </a:solidFill>
-              </a:rPr>
-              <a:t>+</a:t>
-            </a:r>
-            <a:r>
-              <a:rPr lang="en-US" sz="2800" dirty="0"/>
-              <a:t> security </a:t>
-            </a:r>
-            <a:r>
-              <a:rPr lang="en-US" sz="2800" dirty="0">
-                <a:solidFill>
-                  <a:srgbClr val="7030A0"/>
-                </a:solidFill>
-              </a:rPr>
-              <a:t>+ +</a:t>
-            </a:r>
-          </a:p>
-          <a:p>
-            <a:pPr lvl="1"/>
-            <a:endParaRPr lang="en-US" dirty="0"/>
-          </a:p>
-        </p:txBody>
-      </p:sp>
-    </p:spTree>
-    <p:extLst>
-      <p:ext uri="{BB962C8B-B14F-4D97-AF65-F5344CB8AC3E}">
-        <p14:creationId xmlns:p14="http://schemas.microsoft.com/office/powerpoint/2010/main" val="379348850"/>
-      </p:ext>
-    </p:extLst>
-  </p:cSld>
-  <p:clrMapOvr>
-    <a:masterClrMapping/>
-  </p:clrMapOvr>
-  <mc:AlternateContent xmlns:mc="http://schemas.openxmlformats.org/markup-compatibility/2006" xmlns:p14="http://schemas.microsoft.com/office/powerpoint/2010/main">
-    <mc:Choice Requires="p14">
-      <p:transition spd="med" p14:dur="700">
-        <p:fade/>
-      </p:transition>
-    </mc:Choice>
-    <mc:Fallback xmlns="">
-      <p:transition spd="med">
-        <p:fade/>
-      </p:transition>
-    </mc:Fallback>
-  </mc:AlternateContent>
-</p:sld>
-</file>
-
-<file path=ppt/slides/slide3.xml><?xml version="1.0" encoding="utf-8"?>
-<p:sld xmlns:a="http://schemas.openxmlformats.org/drawingml/2006/main" xmlns:r="http://schemas.openxmlformats.org/officeDocument/2006/relationships" xmlns:p="http://schemas.openxmlformats.org/presentationml/2006/main">
-  <p:cSld>
-    <p:spTree>
-      <p:nvGrpSpPr>
-        <p:cNvPr id="1" name=""/>
-        <p:cNvGrpSpPr/>
-        <p:nvPr/>
-      </p:nvGrpSpPr>
-      <p:grpSpPr>
-        <a:xfrm>
-          <a:off x="0" y="0"/>
-          <a:ext cx="0" cy="0"/>
-          <a:chOff x="0" y="0"/>
-          <a:chExt cx="0" cy="0"/>
-        </a:xfrm>
-      </p:grpSpPr>
-      <p:sp>
-        <p:nvSpPr>
-          <p:cNvPr id="2" name="Title 1"/>
-          <p:cNvSpPr>
-            <a:spLocks noGrp="1"/>
-          </p:cNvSpPr>
-          <p:nvPr>
-            <p:ph type="title"/>
-          </p:nvPr>
-        </p:nvSpPr>
-        <p:spPr>
-          <a:xfrm>
-            <a:off x="608012" y="5410200"/>
-            <a:ext cx="10971372" cy="1066800"/>
-          </a:xfrm>
-        </p:spPr>
-        <p:txBody>
-          <a:bodyPr/>
-          <a:lstStyle/>
-          <a:p>
-            <a:r>
-              <a:rPr lang="en-US" dirty="0"/>
-              <a:t>Why use ADF?</a:t>
-            </a:r>
-          </a:p>
-        </p:txBody>
-      </p:sp>
-      <p:sp>
-        <p:nvSpPr>
-          <p:cNvPr id="3" name="Content Placeholder 2"/>
-          <p:cNvSpPr>
-            <a:spLocks noGrp="1"/>
-          </p:cNvSpPr>
-          <p:nvPr>
-            <p:ph idx="13"/>
-          </p:nvPr>
-        </p:nvSpPr>
-        <p:spPr>
-          <a:xfrm>
-            <a:off x="1141412" y="381001"/>
-            <a:ext cx="10287000" cy="5791199"/>
-          </a:xfrm>
-        </p:spPr>
-        <p:txBody>
-          <a:bodyPr>
-            <a:normAutofit/>
-          </a:bodyPr>
-          <a:lstStyle/>
-          <a:p>
-            <a:r>
-              <a:rPr lang="en-US" dirty="0"/>
-              <a:t>The focus of the toolkit is the initial training (ramp up) and allows the customer to </a:t>
-            </a:r>
-            <a:r>
-              <a:rPr lang="en-US" b="1" dirty="0"/>
-              <a:t>get to production </a:t>
-            </a:r>
-            <a:r>
-              <a:rPr lang="en-US" dirty="0"/>
-              <a:t>in Azure faster/efficiently.</a:t>
-            </a:r>
-          </a:p>
-          <a:p>
-            <a:r>
-              <a:rPr lang="en-US" dirty="0"/>
-              <a:t>By using </a:t>
-            </a:r>
-            <a:r>
-              <a:rPr lang="en-US" u="sng" dirty="0"/>
-              <a:t>Infrastructure</a:t>
-            </a:r>
-            <a:r>
-              <a:rPr lang="en-US" dirty="0"/>
-              <a:t> and </a:t>
-            </a:r>
-            <a:r>
-              <a:rPr lang="en-US" u="sng" dirty="0"/>
-              <a:t>Configuration</a:t>
-            </a:r>
-            <a:r>
-              <a:rPr lang="en-US" dirty="0"/>
-              <a:t> as Code</a:t>
-            </a:r>
-            <a:endParaRPr lang="en-US" sz="2400" dirty="0"/>
-          </a:p>
-          <a:p>
-            <a:pPr lvl="1"/>
-            <a:r>
-              <a:rPr lang="en-US" dirty="0"/>
-              <a:t>All code is checked into source control</a:t>
-            </a:r>
-          </a:p>
-          <a:p>
-            <a:pPr lvl="2"/>
-            <a:r>
-              <a:rPr lang="en-US" dirty="0"/>
-              <a:t>Promotes teamwork</a:t>
-            </a:r>
-          </a:p>
-          <a:p>
-            <a:pPr lvl="2"/>
-            <a:r>
-              <a:rPr lang="en-US" dirty="0"/>
-              <a:t>Easy sharing of code between the team</a:t>
-            </a:r>
-          </a:p>
-          <a:p>
-            <a:pPr lvl="2"/>
-            <a:r>
-              <a:rPr lang="en-US" dirty="0"/>
-              <a:t>Allows ongoing support for the customer throughout the application lifecycle</a:t>
-            </a:r>
-          </a:p>
-          <a:p>
-            <a:pPr lvl="1"/>
-            <a:r>
-              <a:rPr lang="en-US" dirty="0"/>
-              <a:t>Documentation as Code</a:t>
-            </a:r>
-          </a:p>
-          <a:p>
-            <a:r>
-              <a:rPr lang="en-US" dirty="0"/>
-              <a:t>We use the exact same code for the full application lifecycle</a:t>
-            </a:r>
-          </a:p>
-          <a:p>
-            <a:pPr marL="330200" lvl="1" indent="0">
-              <a:buNone/>
-            </a:pPr>
-            <a:r>
-              <a:rPr lang="en-US" dirty="0"/>
-              <a:t>  Development </a:t>
-            </a:r>
-            <a:r>
-              <a:rPr lang="en-US" dirty="0">
-                <a:sym typeface="Wingdings" panose="05000000000000000000" pitchFamily="2" charset="2"/>
-              </a:rPr>
-              <a:t></a:t>
-            </a:r>
-            <a:r>
-              <a:rPr lang="en-US" dirty="0"/>
-              <a:t> Test </a:t>
-            </a:r>
-            <a:r>
-              <a:rPr lang="en-US" dirty="0">
-                <a:sym typeface="Wingdings" panose="05000000000000000000" pitchFamily="2" charset="2"/>
-              </a:rPr>
-              <a:t> </a:t>
-            </a:r>
-            <a:r>
-              <a:rPr lang="en-US" dirty="0"/>
-              <a:t>QA </a:t>
-            </a:r>
-            <a:r>
-              <a:rPr lang="en-US" dirty="0">
-                <a:sym typeface="Wingdings" panose="05000000000000000000" pitchFamily="2" charset="2"/>
-              </a:rPr>
-              <a:t> </a:t>
-            </a:r>
-            <a:r>
-              <a:rPr lang="en-US" dirty="0"/>
-              <a:t>Production </a:t>
-            </a:r>
-            <a:r>
-              <a:rPr lang="en-US" dirty="0">
-                <a:sym typeface="Wingdings" panose="05000000000000000000" pitchFamily="2" charset="2"/>
-              </a:rPr>
-              <a:t> Development</a:t>
-            </a:r>
-          </a:p>
-          <a:p>
-            <a:pPr lvl="1"/>
-            <a:endParaRPr lang="en-US" dirty="0"/>
-          </a:p>
-          <a:p>
-            <a:pPr lvl="1"/>
-            <a:r>
-              <a:rPr lang="en-US" dirty="0"/>
-              <a:t>Allows the ability to easily spin up Multiple instances of Application environments (side by side)</a:t>
-            </a:r>
-          </a:p>
-        </p:txBody>
-      </p:sp>
-      <mc:AlternateContent xmlns:mc="http://schemas.openxmlformats.org/markup-compatibility/2006" xmlns:p14="http://schemas.microsoft.com/office/powerpoint/2010/main">
-        <mc:Choice Requires="p14">
-          <p:contentPart p14:bwMode="auto" r:id="rId2">
-            <p14:nvContentPartPr>
-              <p14:cNvPr id="29" name="Ink 28">
-                <a:extLst>
-                  <a:ext uri="{FF2B5EF4-FFF2-40B4-BE49-F238E27FC236}">
-                    <a16:creationId xmlns:a16="http://schemas.microsoft.com/office/drawing/2014/main" id="{C38CFCE8-FB71-4FA0-897A-5D65E9286E40}"/>
-                  </a:ext>
-                </a:extLst>
-              </p14:cNvPr>
-              <p14:cNvContentPartPr/>
-              <p14:nvPr/>
-            </p14:nvContentPartPr>
-            <p14:xfrm>
-              <a:off x="778447" y="4274365"/>
-              <a:ext cx="8986680" cy="675720"/>
-            </p14:xfrm>
-          </p:contentPart>
-        </mc:Choice>
-        <mc:Fallback xmlns="">
-          <p:pic>
-            <p:nvPicPr>
-              <p:cNvPr id="29" name="Ink 28">
-                <a:extLst>
-                  <a:ext uri="{FF2B5EF4-FFF2-40B4-BE49-F238E27FC236}">
-                    <a16:creationId xmlns:a16="http://schemas.microsoft.com/office/drawing/2014/main" id="{C38CFCE8-FB71-4FA0-897A-5D65E9286E40}"/>
-                  </a:ext>
-                </a:extLst>
-              </p:cNvPr>
-              <p:cNvPicPr/>
-              <p:nvPr/>
-            </p:nvPicPr>
-            <p:blipFill>
-              <a:blip r:embed="rId3"/>
-              <a:stretch>
-                <a:fillRect/>
-              </a:stretch>
-            </p:blipFill>
-            <p:spPr>
-              <a:xfrm>
-                <a:off x="740287" y="4236205"/>
-                <a:ext cx="9062640" cy="751680"/>
-              </a:xfrm>
-              <a:prstGeom prst="rect">
-                <a:avLst/>
-              </a:prstGeom>
-            </p:spPr>
-          </p:pic>
-        </mc:Fallback>
-      </mc:AlternateContent>
-      <mc:AlternateContent xmlns:mc="http://schemas.openxmlformats.org/markup-compatibility/2006" xmlns:p14="http://schemas.microsoft.com/office/powerpoint/2010/main">
-        <mc:Choice Requires="p14">
-          <p:contentPart p14:bwMode="auto" r:id="rId4">
-            <p14:nvContentPartPr>
-              <p14:cNvPr id="31" name="Ink 30">
-                <a:extLst>
-                  <a:ext uri="{FF2B5EF4-FFF2-40B4-BE49-F238E27FC236}">
-                    <a16:creationId xmlns:a16="http://schemas.microsoft.com/office/drawing/2014/main" id="{1DA1C568-BB4C-49C8-B71B-3E91A8D9211B}"/>
-                  </a:ext>
-                </a:extLst>
-              </p14:cNvPr>
-              <p14:cNvContentPartPr/>
-              <p14:nvPr/>
-            </p14:nvContentPartPr>
-            <p14:xfrm>
-              <a:off x="1053487" y="4517725"/>
-              <a:ext cx="398520" cy="93600"/>
-            </p14:xfrm>
-          </p:contentPart>
-        </mc:Choice>
-        <mc:Fallback xmlns="">
-          <p:pic>
-            <p:nvPicPr>
-              <p:cNvPr id="31" name="Ink 30">
-                <a:extLst>
-                  <a:ext uri="{FF2B5EF4-FFF2-40B4-BE49-F238E27FC236}">
-                    <a16:creationId xmlns:a16="http://schemas.microsoft.com/office/drawing/2014/main" id="{1DA1C568-BB4C-49C8-B71B-3E91A8D9211B}"/>
-                  </a:ext>
-                </a:extLst>
-              </p:cNvPr>
-              <p:cNvPicPr/>
-              <p:nvPr/>
-            </p:nvPicPr>
-            <p:blipFill>
-              <a:blip r:embed="rId5"/>
-              <a:stretch>
-                <a:fillRect/>
-              </a:stretch>
-            </p:blipFill>
-            <p:spPr>
-              <a:xfrm>
-                <a:off x="1015327" y="4479418"/>
-                <a:ext cx="474480" cy="169853"/>
-              </a:xfrm>
-              <a:prstGeom prst="rect">
-                <a:avLst/>
-              </a:prstGeom>
-            </p:spPr>
-          </p:pic>
-        </mc:Fallback>
-      </mc:AlternateContent>
-    </p:spTree>
-    <p:extLst>
-      <p:ext uri="{BB962C8B-B14F-4D97-AF65-F5344CB8AC3E}">
-        <p14:creationId xmlns:p14="http://schemas.microsoft.com/office/powerpoint/2010/main" val="4221582426"/>
-      </p:ext>
-    </p:extLst>
-  </p:cSld>
-  <p:clrMapOvr>
-    <a:masterClrMapping/>
-  </p:clrMapOvr>
-  <mc:AlternateContent xmlns:mc="http://schemas.openxmlformats.org/markup-compatibility/2006" xmlns:p14="http://schemas.microsoft.com/office/powerpoint/2010/main">
-    <mc:Choice Requires="p14">
-      <p:transition spd="med" p14:dur="700">
-        <p:fade/>
-      </p:transition>
-    </mc:Choice>
-    <mc:Fallback xmlns="">
-      <p:transition spd="med">
-        <p:fade/>
-      </p:transition>
-    </mc:Fallback>
-  </mc:AlternateContent>
-</p:sld>
-</file>
-
-<file path=ppt/slides/slide4.xml><?xml version="1.0" encoding="utf-8"?>
-<p:sld xmlns:a="http://schemas.openxmlformats.org/drawingml/2006/main" xmlns:r="http://schemas.openxmlformats.org/officeDocument/2006/relationships" xmlns:p="http://schemas.openxmlformats.org/presentationml/2006/main">
-  <p:cSld>
-    <p:spTree>
-      <p:nvGrpSpPr>
-        <p:cNvPr id="1" name=""/>
-        <p:cNvGrpSpPr/>
-        <p:nvPr/>
-      </p:nvGrpSpPr>
-      <p:grpSpPr>
-        <a:xfrm>
-          <a:off x="0" y="0"/>
-          <a:ext cx="0" cy="0"/>
-          <a:chOff x="0" y="0"/>
-          <a:chExt cx="0" cy="0"/>
-        </a:xfrm>
-      </p:grpSpPr>
-      <p:sp>
-        <p:nvSpPr>
-          <p:cNvPr id="2" name="Title 1"/>
-          <p:cNvSpPr>
-            <a:spLocks noGrp="1"/>
-          </p:cNvSpPr>
-          <p:nvPr>
-            <p:ph type="title"/>
-          </p:nvPr>
-        </p:nvSpPr>
-        <p:spPr>
-          <a:xfrm>
-            <a:off x="455612" y="5257800"/>
-            <a:ext cx="10971372" cy="1066800"/>
-          </a:xfrm>
-        </p:spPr>
-        <p:txBody>
-          <a:bodyPr/>
-          <a:lstStyle/>
-          <a:p>
-            <a:r>
-              <a:rPr lang="en-US" dirty="0"/>
-              <a:t>When to use ADF?</a:t>
-            </a:r>
-          </a:p>
-        </p:txBody>
-      </p:sp>
-      <p:sp>
-        <p:nvSpPr>
-          <p:cNvPr id="3" name="Content Placeholder 2"/>
-          <p:cNvSpPr>
-            <a:spLocks noGrp="1"/>
-          </p:cNvSpPr>
-          <p:nvPr>
-            <p:ph sz="half" idx="1"/>
-          </p:nvPr>
-        </p:nvSpPr>
-        <p:spPr>
-          <a:xfrm>
-            <a:off x="609440" y="685800"/>
-            <a:ext cx="6246971" cy="4876800"/>
-          </a:xfrm>
-        </p:spPr>
-        <p:txBody>
-          <a:bodyPr>
-            <a:normAutofit/>
-          </a:bodyPr>
-          <a:lstStyle/>
-          <a:p>
-            <a:r>
-              <a:rPr lang="en-US" dirty="0"/>
-              <a:t>To walk through the layers of Azure </a:t>
-            </a:r>
-            <a:r>
-              <a:rPr lang="en-US" b="1" dirty="0"/>
-              <a:t>and</a:t>
-            </a:r>
-            <a:r>
-              <a:rPr lang="en-US" dirty="0"/>
-              <a:t> understand the customer application step by step.</a:t>
-            </a:r>
-          </a:p>
-          <a:p>
-            <a:r>
-              <a:rPr lang="en-US" dirty="0"/>
-              <a:t>Document requirements as you go.</a:t>
-            </a:r>
-          </a:p>
-          <a:p>
-            <a:r>
-              <a:rPr lang="en-US" dirty="0"/>
-              <a:t>Ideal for lift and shift, with focus on full Automation (not imaging).</a:t>
-            </a:r>
-          </a:p>
-          <a:p>
-            <a:r>
-              <a:rPr lang="en-US" dirty="0"/>
-              <a:t>Best suited to Application migrations (not full datacenter migrations).</a:t>
-            </a:r>
-          </a:p>
-          <a:p>
-            <a:r>
-              <a:rPr lang="en-US" dirty="0"/>
-              <a:t>Easier to implement for Developers, over Operators? (</a:t>
-            </a:r>
-            <a:r>
-              <a:rPr lang="en-US" dirty="0" err="1"/>
-              <a:t>IaC</a:t>
-            </a:r>
-            <a:r>
-              <a:rPr lang="en-US" dirty="0"/>
-              <a:t>).</a:t>
-            </a:r>
-          </a:p>
-        </p:txBody>
-      </p:sp>
-      <p:graphicFrame>
-        <p:nvGraphicFramePr>
-          <p:cNvPr id="5" name="Content Placeholder 4" descr="Basic venn diagram showing overlapping relationships between 4 tasks"/>
-          <p:cNvGraphicFramePr>
-            <a:graphicFrameLocks noGrp="1"/>
-          </p:cNvGraphicFramePr>
-          <p:nvPr>
-            <p:ph sz="half" idx="2"/>
-            <p:extLst>
-              <p:ext uri="{D42A27DB-BD31-4B8C-83A1-F6EECF244321}">
-                <p14:modId xmlns:p14="http://schemas.microsoft.com/office/powerpoint/2010/main" val="4246510064"/>
-              </p:ext>
-            </p:extLst>
-          </p:nvPr>
-        </p:nvGraphicFramePr>
-        <p:xfrm>
-          <a:off x="6551613" y="685800"/>
-          <a:ext cx="5029200" cy="4191000"/>
-        </p:xfrm>
-        <a:graphic>
-          <a:graphicData uri="http://schemas.openxmlformats.org/drawingml/2006/diagram">
-            <dgm:relIds xmlns:dgm="http://schemas.openxmlformats.org/drawingml/2006/diagram" xmlns:r="http://schemas.openxmlformats.org/officeDocument/2006/relationships" r:dm="rId2" r:lo="rId3" r:qs="rId4" r:cs="rId5"/>
-          </a:graphicData>
-        </a:graphic>
-      </p:graphicFrame>
-    </p:spTree>
-    <p:extLst>
-      <p:ext uri="{BB962C8B-B14F-4D97-AF65-F5344CB8AC3E}">
-        <p14:creationId xmlns:p14="http://schemas.microsoft.com/office/powerpoint/2010/main" val="3098616160"/>
-      </p:ext>
-    </p:extLst>
-  </p:cSld>
-  <p:clrMapOvr>
-    <a:masterClrMapping/>
-  </p:clrMapOvr>
-  <mc:AlternateContent xmlns:mc="http://schemas.openxmlformats.org/markup-compatibility/2006" xmlns:p14="http://schemas.microsoft.com/office/powerpoint/2010/main">
-    <mc:Choice Requires="p14">
-      <p:transition spd="med" p14:dur="700">
-        <p:fade/>
-      </p:transition>
-    </mc:Choice>
-    <mc:Fallback xmlns="">
-      <p:transition spd="med">
-        <p:fade/>
-      </p:transition>
-    </mc:Fallback>
-  </mc:AlternateContent>
-</p:sld>
-</file>
-
-<file path=ppt/slides/slide5.xml><?xml version="1.0" encoding="utf-8"?>
-<p:sld xmlns:a="http://schemas.openxmlformats.org/drawingml/2006/main" xmlns:r="http://schemas.openxmlformats.org/officeDocument/2006/relationships" xmlns:p="http://schemas.openxmlformats.org/presentationml/2006/main">
-  <p:cSld>
-    <p:spTree>
-      <p:nvGrpSpPr>
-        <p:cNvPr id="1" name=""/>
-        <p:cNvGrpSpPr/>
-        <p:nvPr/>
-      </p:nvGrpSpPr>
-      <p:grpSpPr>
-        <a:xfrm>
-          <a:off x="0" y="0"/>
-          <a:ext cx="0" cy="0"/>
-          <a:chOff x="0" y="0"/>
-          <a:chExt cx="0" cy="0"/>
-        </a:xfrm>
-      </p:grpSpPr>
-      <p:sp>
-        <p:nvSpPr>
-          <p:cNvPr id="2" name="Title 1"/>
-          <p:cNvSpPr>
-            <a:spLocks noGrp="1"/>
-          </p:cNvSpPr>
-          <p:nvPr>
-            <p:ph type="title"/>
-          </p:nvPr>
-        </p:nvSpPr>
-        <p:spPr>
-          <a:xfrm>
-            <a:off x="455612" y="5605462"/>
-            <a:ext cx="11430000" cy="1066800"/>
-          </a:xfrm>
-        </p:spPr>
-        <p:txBody>
-          <a:bodyPr/>
-          <a:lstStyle/>
-          <a:p>
-            <a:r>
-              <a:rPr lang="en-US" dirty="0"/>
-              <a:t>How to get started? (Understand what ADF can do)</a:t>
-            </a:r>
-          </a:p>
-        </p:txBody>
-      </p:sp>
-      <p:pic>
-        <p:nvPicPr>
-          <p:cNvPr id="5" name="Picture 4">
-            <a:extLst>
-              <a:ext uri="{FF2B5EF4-FFF2-40B4-BE49-F238E27FC236}">
-                <a16:creationId xmlns:a16="http://schemas.microsoft.com/office/drawing/2014/main" id="{B9713008-544C-4C7A-AF7F-4122086B1E37}"/>
-              </a:ext>
-            </a:extLst>
-          </p:cNvPr>
-          <p:cNvPicPr>
-            <a:picLocks noChangeAspect="1"/>
-          </p:cNvPicPr>
-          <p:nvPr/>
-        </p:nvPicPr>
-        <p:blipFill>
-          <a:blip r:embed="rId2"/>
-          <a:stretch>
-            <a:fillRect/>
-          </a:stretch>
-        </p:blipFill>
-        <p:spPr>
-          <a:xfrm>
-            <a:off x="2055812" y="42862"/>
-            <a:ext cx="7716709" cy="6096000"/>
-          </a:xfrm>
-          <a:prstGeom prst="rect">
-            <a:avLst/>
-          </a:prstGeom>
-        </p:spPr>
-      </p:pic>
-    </p:spTree>
-    <p:extLst>
-      <p:ext uri="{BB962C8B-B14F-4D97-AF65-F5344CB8AC3E}">
-        <p14:creationId xmlns:p14="http://schemas.microsoft.com/office/powerpoint/2010/main" val="3846006634"/>
-      </p:ext>
-    </p:extLst>
-  </p:cSld>
-  <p:clrMapOvr>
-    <a:masterClrMapping/>
-  </p:clrMapOvr>
-  <mc:AlternateContent xmlns:mc="http://schemas.openxmlformats.org/markup-compatibility/2006" xmlns:p14="http://schemas.microsoft.com/office/powerpoint/2010/main">
-    <mc:Choice Requires="p14">
-      <p:transition spd="med" p14:dur="700">
-        <p:fade/>
-      </p:transition>
-    </mc:Choice>
-    <mc:Fallback xmlns="">
-      <p:transition spd="med">
-        <p:fade/>
-      </p:transition>
-    </mc:Fallback>
-  </mc:AlternateContent>
-</p:sld>
-</file>
-
-<file path=ppt/slides/slide6.xml><?xml version="1.0" encoding="utf-8"?>
-<p:sld xmlns:a="http://schemas.openxmlformats.org/drawingml/2006/main" xmlns:r="http://schemas.openxmlformats.org/officeDocument/2006/relationships" xmlns:p="http://schemas.openxmlformats.org/presentationml/2006/main">
-  <p:cSld>
-    <p:spTree>
-      <p:nvGrpSpPr>
-        <p:cNvPr id="1" name=""/>
-        <p:cNvGrpSpPr/>
-        <p:nvPr/>
-      </p:nvGrpSpPr>
-      <p:grpSpPr>
-        <a:xfrm>
-          <a:off x="0" y="0"/>
-          <a:ext cx="0" cy="0"/>
-          <a:chOff x="0" y="0"/>
-          <a:chExt cx="0" cy="0"/>
-        </a:xfrm>
-      </p:grpSpPr>
-      <p:sp>
-        <p:nvSpPr>
-          <p:cNvPr id="2" name="Title 1"/>
-          <p:cNvSpPr>
-            <a:spLocks noGrp="1"/>
-          </p:cNvSpPr>
-          <p:nvPr>
-            <p:ph type="title"/>
-          </p:nvPr>
-        </p:nvSpPr>
-        <p:spPr>
-          <a:xfrm>
-            <a:off x="455612" y="5257800"/>
-            <a:ext cx="10971372" cy="1066800"/>
-          </a:xfrm>
-        </p:spPr>
-        <p:txBody>
-          <a:bodyPr/>
-          <a:lstStyle/>
-          <a:p>
-            <a:r>
-              <a:rPr lang="en-US" dirty="0"/>
-              <a:t>How to get started?</a:t>
-            </a:r>
-          </a:p>
-        </p:txBody>
-      </p:sp>
-      <p:sp>
-        <p:nvSpPr>
-          <p:cNvPr id="3" name="Content Placeholder 2"/>
-          <p:cNvSpPr>
-            <a:spLocks noGrp="1"/>
-          </p:cNvSpPr>
-          <p:nvPr>
-            <p:ph sz="half" idx="1"/>
-          </p:nvPr>
-        </p:nvSpPr>
-        <p:spPr>
-          <a:xfrm>
-            <a:off x="609440" y="685800"/>
-            <a:ext cx="9828372" cy="5029200"/>
-          </a:xfrm>
-        </p:spPr>
-        <p:txBody>
-          <a:bodyPr>
-            <a:normAutofit fontScale="92500" lnSpcReduction="20000"/>
-          </a:bodyPr>
-          <a:lstStyle/>
-          <a:p>
-            <a:pPr marL="514350" indent="-514350">
-              <a:buFont typeface="+mj-lt"/>
-              <a:buAutoNum type="arabicPeriod"/>
-            </a:pPr>
-            <a:r>
-              <a:rPr lang="en-US" dirty="0"/>
-              <a:t>Become familiar with the tools and processes used in ADF</a:t>
-            </a:r>
-          </a:p>
-          <a:p>
-            <a:pPr lvl="1"/>
-            <a:r>
-              <a:rPr lang="en-US" dirty="0"/>
-              <a:t>Start deploying straight away</a:t>
-            </a:r>
-          </a:p>
-          <a:p>
-            <a:pPr lvl="1"/>
-            <a:r>
-              <a:rPr lang="en-US" dirty="0"/>
-              <a:t>Start to work on the DSC configurations for the Application</a:t>
-            </a:r>
-          </a:p>
-          <a:p>
-            <a:pPr marL="514350" indent="-514350">
-              <a:buFont typeface="+mj-lt"/>
-              <a:buAutoNum type="arabicPeriod"/>
-            </a:pPr>
-            <a:r>
-              <a:rPr lang="en-US" dirty="0"/>
-              <a:t>Discuss Azure capabilities and build the configurations</a:t>
-            </a:r>
-          </a:p>
-          <a:p>
-            <a:pPr lvl="1"/>
-            <a:r>
-              <a:rPr lang="en-US" dirty="0"/>
-              <a:t>Log Analytics</a:t>
-            </a:r>
-          </a:p>
-          <a:p>
-            <a:pPr lvl="1"/>
-            <a:r>
-              <a:rPr lang="en-US" dirty="0"/>
-              <a:t>Virtual Networks</a:t>
-            </a:r>
-          </a:p>
-          <a:p>
-            <a:pPr lvl="2"/>
-            <a:r>
-              <a:rPr lang="en-US" dirty="0"/>
-              <a:t>Topology</a:t>
-            </a:r>
-          </a:p>
-          <a:p>
-            <a:pPr lvl="2"/>
-            <a:r>
-              <a:rPr lang="en-US" dirty="0"/>
-              <a:t>Subnet sizes</a:t>
-            </a:r>
-          </a:p>
-          <a:p>
-            <a:pPr lvl="2"/>
-            <a:r>
-              <a:rPr lang="en-US" dirty="0"/>
-              <a:t>NSG’s</a:t>
-            </a:r>
-          </a:p>
-          <a:p>
-            <a:pPr lvl="1"/>
-            <a:r>
-              <a:rPr lang="en-US" dirty="0"/>
-              <a:t>Load Balancers</a:t>
-            </a:r>
-          </a:p>
-          <a:p>
-            <a:pPr lvl="1"/>
-            <a:r>
-              <a:rPr lang="en-US" dirty="0"/>
-              <a:t>Virtual Machines</a:t>
-            </a:r>
-          </a:p>
-          <a:p>
-            <a:pPr lvl="2"/>
-            <a:r>
-              <a:rPr lang="en-US" dirty="0"/>
-              <a:t>Linux</a:t>
-            </a:r>
-          </a:p>
-          <a:p>
-            <a:pPr lvl="2"/>
-            <a:r>
-              <a:rPr lang="en-US" dirty="0"/>
-              <a:t>Windows</a:t>
-            </a:r>
-          </a:p>
-          <a:p>
-            <a:pPr lvl="2"/>
-            <a:r>
-              <a:rPr lang="en-US" dirty="0"/>
-              <a:t>Appliances</a:t>
-            </a:r>
-          </a:p>
-          <a:p>
-            <a:pPr lvl="1"/>
-            <a:r>
-              <a:rPr lang="en-US" dirty="0"/>
-              <a:t>Web Application Firewalls</a:t>
-            </a:r>
-          </a:p>
-        </p:txBody>
-      </p:sp>
-    </p:spTree>
-    <p:extLst>
-      <p:ext uri="{BB962C8B-B14F-4D97-AF65-F5344CB8AC3E}">
-        <p14:creationId xmlns:p14="http://schemas.microsoft.com/office/powerpoint/2010/main" val="1292389478"/>
-      </p:ext>
-    </p:extLst>
-  </p:cSld>
-  <p:clrMapOvr>
-    <a:masterClrMapping/>
-  </p:clrMapOvr>
-  <mc:AlternateContent xmlns:mc="http://schemas.openxmlformats.org/markup-compatibility/2006" xmlns:p14="http://schemas.microsoft.com/office/powerpoint/2010/main">
-    <mc:Choice Requires="p14">
-      <p:transition spd="med" p14:dur="700">
-        <p:fade/>
-      </p:transition>
-    </mc:Choice>
-    <mc:Fallback xmlns="">
-      <p:transition spd="med">
-        <p:fade/>
-      </p:transition>
-    </mc:Fallback>
-  </mc:AlternateContent>
-</p:sld>
-</file>
-
-<file path=ppt/slides/slide7.xml><?xml version="1.0" encoding="utf-8"?>
-<p:sld xmlns:a="http://schemas.openxmlformats.org/drawingml/2006/main" xmlns:r="http://schemas.openxmlformats.org/officeDocument/2006/relationships" xmlns:p="http://schemas.openxmlformats.org/presentationml/2006/main">
-  <p:cSld>
-    <p:spTree>
-      <p:nvGrpSpPr>
-        <p:cNvPr id="1" name=""/>
-        <p:cNvGrpSpPr/>
-        <p:nvPr/>
-      </p:nvGrpSpPr>
-      <p:grpSpPr>
-        <a:xfrm>
-          <a:off x="0" y="0"/>
-          <a:ext cx="0" cy="0"/>
-          <a:chOff x="0" y="0"/>
-          <a:chExt cx="0" cy="0"/>
-        </a:xfrm>
-      </p:grpSpPr>
-      <p:sp>
-        <p:nvSpPr>
-          <p:cNvPr id="2" name="Title 1"/>
-          <p:cNvSpPr>
-            <a:spLocks noGrp="1"/>
-          </p:cNvSpPr>
-          <p:nvPr>
-            <p:ph type="title"/>
-          </p:nvPr>
-        </p:nvSpPr>
-        <p:spPr>
-          <a:xfrm>
-            <a:off x="609440" y="5249248"/>
-            <a:ext cx="10971372" cy="1066800"/>
-          </a:xfrm>
-        </p:spPr>
-        <p:txBody>
-          <a:bodyPr/>
-          <a:lstStyle/>
-          <a:p>
-            <a:r>
-              <a:rPr lang="en-US" dirty="0"/>
-              <a:t>How to get started? (start deploying with ARM)</a:t>
-            </a:r>
-          </a:p>
-        </p:txBody>
-      </p:sp>
-      <p:pic>
-        <p:nvPicPr>
-          <p:cNvPr id="8" name="Picture 7">
-            <a:extLst>
-              <a:ext uri="{FF2B5EF4-FFF2-40B4-BE49-F238E27FC236}">
-                <a16:creationId xmlns:a16="http://schemas.microsoft.com/office/drawing/2014/main" id="{93A4D04C-E03E-4585-B4BB-67FAD1D2ACBC}"/>
-              </a:ext>
-            </a:extLst>
-          </p:cNvPr>
-          <p:cNvPicPr>
-            <a:picLocks noChangeAspect="1"/>
-          </p:cNvPicPr>
-          <p:nvPr/>
-        </p:nvPicPr>
-        <p:blipFill>
-          <a:blip r:embed="rId2"/>
-          <a:stretch>
-            <a:fillRect/>
-          </a:stretch>
-        </p:blipFill>
-        <p:spPr>
-          <a:xfrm>
-            <a:off x="1141412" y="533400"/>
-            <a:ext cx="9448800" cy="4841975"/>
-          </a:xfrm>
-          <a:prstGeom prst="rect">
-            <a:avLst/>
-          </a:prstGeom>
-        </p:spPr>
-      </p:pic>
-      <p:pic>
-        <p:nvPicPr>
-          <p:cNvPr id="9" name="Picture 8">
-            <a:extLst>
-              <a:ext uri="{FF2B5EF4-FFF2-40B4-BE49-F238E27FC236}">
-                <a16:creationId xmlns:a16="http://schemas.microsoft.com/office/drawing/2014/main" id="{ED828013-3ED4-4DCD-B6C9-CF64990C5BD2}"/>
-              </a:ext>
-            </a:extLst>
-          </p:cNvPr>
-          <p:cNvPicPr>
-            <a:picLocks noChangeAspect="1"/>
-          </p:cNvPicPr>
-          <p:nvPr/>
-        </p:nvPicPr>
-        <p:blipFill>
-          <a:blip r:embed="rId3"/>
-          <a:stretch>
-            <a:fillRect/>
-          </a:stretch>
-        </p:blipFill>
-        <p:spPr>
-          <a:xfrm>
-            <a:off x="2350565" y="412523"/>
-            <a:ext cx="6715648" cy="5083728"/>
-          </a:xfrm>
-          <a:prstGeom prst="rect">
-            <a:avLst/>
-          </a:prstGeom>
-        </p:spPr>
-      </p:pic>
-      <p:pic>
-        <p:nvPicPr>
-          <p:cNvPr id="11" name="Picture 10">
-            <a:extLst>
-              <a:ext uri="{FF2B5EF4-FFF2-40B4-BE49-F238E27FC236}">
-                <a16:creationId xmlns:a16="http://schemas.microsoft.com/office/drawing/2014/main" id="{B3A1658E-1020-4B6D-AC9E-F034AC7CBAD9}"/>
-              </a:ext>
-            </a:extLst>
-          </p:cNvPr>
-          <p:cNvPicPr>
-            <a:picLocks noChangeAspect="1"/>
-          </p:cNvPicPr>
-          <p:nvPr/>
-        </p:nvPicPr>
-        <p:blipFill>
-          <a:blip r:embed="rId4"/>
-          <a:stretch>
-            <a:fillRect/>
-          </a:stretch>
-        </p:blipFill>
-        <p:spPr>
-          <a:xfrm>
-            <a:off x="2174121" y="562294"/>
-            <a:ext cx="7068536" cy="4686954"/>
-          </a:xfrm>
-          <a:prstGeom prst="rect">
-            <a:avLst/>
-          </a:prstGeom>
-        </p:spPr>
-      </p:pic>
-      <p:pic>
-        <p:nvPicPr>
-          <p:cNvPr id="12" name="Picture 11">
-            <a:extLst>
-              <a:ext uri="{FF2B5EF4-FFF2-40B4-BE49-F238E27FC236}">
-                <a16:creationId xmlns:a16="http://schemas.microsoft.com/office/drawing/2014/main" id="{F1EB9362-29E7-411D-AAD3-D3005AAD10C9}"/>
-              </a:ext>
-            </a:extLst>
-          </p:cNvPr>
-          <p:cNvPicPr>
-            <a:picLocks noChangeAspect="1"/>
-          </p:cNvPicPr>
-          <p:nvPr/>
-        </p:nvPicPr>
-        <p:blipFill>
-          <a:blip r:embed="rId5"/>
-          <a:stretch>
-            <a:fillRect/>
-          </a:stretch>
-        </p:blipFill>
-        <p:spPr>
-          <a:xfrm>
-            <a:off x="2489411" y="815694"/>
-            <a:ext cx="7211431" cy="4467849"/>
-          </a:xfrm>
-          <a:prstGeom prst="rect">
-            <a:avLst/>
-          </a:prstGeom>
-        </p:spPr>
-      </p:pic>
-      <p:pic>
-        <p:nvPicPr>
-          <p:cNvPr id="13" name="Picture 12">
-            <a:extLst>
-              <a:ext uri="{FF2B5EF4-FFF2-40B4-BE49-F238E27FC236}">
-                <a16:creationId xmlns:a16="http://schemas.microsoft.com/office/drawing/2014/main" id="{2878409D-B478-4D7D-92CA-07299B041236}"/>
-              </a:ext>
-            </a:extLst>
-          </p:cNvPr>
-          <p:cNvPicPr>
-            <a:picLocks noChangeAspect="1"/>
-          </p:cNvPicPr>
-          <p:nvPr/>
-        </p:nvPicPr>
-        <p:blipFill>
-          <a:blip r:embed="rId6"/>
-          <a:stretch>
-            <a:fillRect/>
-          </a:stretch>
-        </p:blipFill>
-        <p:spPr>
-          <a:xfrm>
-            <a:off x="3430516" y="829031"/>
-            <a:ext cx="4972744" cy="4153480"/>
-          </a:xfrm>
-          <a:prstGeom prst="rect">
-            <a:avLst/>
-          </a:prstGeom>
-        </p:spPr>
-      </p:pic>
-    </p:spTree>
-    <p:extLst>
-      <p:ext uri="{BB962C8B-B14F-4D97-AF65-F5344CB8AC3E}">
-        <p14:creationId xmlns:p14="http://schemas.microsoft.com/office/powerpoint/2010/main" val="381540845"/>
-      </p:ext>
-    </p:extLst>
-  </p:cSld>
-  <p:clrMapOvr>
-    <a:masterClrMapping/>
-  </p:clrMapOvr>
-  <mc:AlternateContent xmlns:mc="http://schemas.openxmlformats.org/markup-compatibility/2006" xmlns:p14="http://schemas.microsoft.com/office/powerpoint/2010/main">
-    <mc:Choice Requires="p14">
-      <p:transition spd="med" p14:dur="700">
-        <p:fade/>
-      </p:transition>
-    </mc:Choice>
-    <mc:Fallback xmlns="">
-      <p:transition spd="med">
-        <p:fade/>
-      </p:transition>
-    </mc:Fallback>
-  </mc:AlternateContent>
-  <p:timing>
-    <p:tnLst>
-      <p:par>
-        <p:cTn id="1" dur="indefinite" restart="never" nodeType="tmRoot">
-          <p:childTnLst>
-            <p:seq concurrent="1" nextAc="seek">
-              <p:cTn id="2" dur="indefinite" nodeType="mainSeq">
-                <p:childTnLst>
-                  <p:par>
-                    <p:cTn id="3" fill="hold">
-                      <p:stCondLst>
-                        <p:cond delay="indefinite"/>
-                      </p:stCondLst>
-                      <p:childTnLst>
-                        <p:par>
-                          <p:cTn id="4" fill="hold">
-                            <p:stCondLst>
-                              <p:cond delay="0"/>
-                            </p:stCondLst>
-                            <p:childTnLst>
-                              <p:par>
-                                <p:cTn id="5" presetID="1" presetClass="entr" presetSubtype="0" fill="hold" nodeType="clickEffect">
-                                  <p:stCondLst>
-                                    <p:cond delay="0"/>
-                                  </p:stCondLst>
-                                  <p:childTnLst>
-                                    <p:set>
-                                      <p:cBhvr>
-                                        <p:cTn id="6" dur="1" fill="hold">
-                                          <p:stCondLst>
-                                            <p:cond delay="0"/>
-                                          </p:stCondLst>
-                                        </p:cTn>
-                                        <p:tgtEl>
-                                          <p:spTgt spid="8"/>
-                                        </p:tgtEl>
-                                        <p:attrNameLst>
-                                          <p:attrName>style.visibility</p:attrName>
-                                        </p:attrNameLst>
-                                      </p:cBhvr>
-                                      <p:to>
-                                        <p:strVal val="visible"/>
-                                      </p:to>
-                                    </p:set>
-                                  </p:childTnLst>
-                                </p:cTn>
-                              </p:par>
-                            </p:childTnLst>
-                          </p:cTn>
-                        </p:par>
-                      </p:childTnLst>
-                    </p:cTn>
-                  </p:par>
-                  <p:par>
-                    <p:cTn id="7" fill="hold">
-                      <p:stCondLst>
-                        <p:cond delay="indefinite"/>
-                      </p:stCondLst>
-                      <p:childTnLst>
-                        <p:par>
-                          <p:cTn id="8" fill="hold">
-                            <p:stCondLst>
-                              <p:cond delay="0"/>
-                            </p:stCondLst>
-                            <p:childTnLst>
-                              <p:par>
-                                <p:cTn id="9" presetID="1" presetClass="exit" presetSubtype="0" fill="hold" nodeType="clickEffect">
-                                  <p:stCondLst>
-                                    <p:cond delay="0"/>
-                                  </p:stCondLst>
-                                  <p:childTnLst>
-                                    <p:set>
-                                      <p:cBhvr>
-                                        <p:cTn id="10" dur="1" fill="hold">
-                                          <p:stCondLst>
-                                            <p:cond delay="0"/>
-                                          </p:stCondLst>
-                                        </p:cTn>
-                                        <p:tgtEl>
-                                          <p:spTgt spid="8"/>
-                                        </p:tgtEl>
-                                        <p:attrNameLst>
-                                          <p:attrName>style.visibility</p:attrName>
-                                        </p:attrNameLst>
-                                      </p:cBhvr>
-                                      <p:to>
-                                        <p:strVal val="hidden"/>
-                                      </p:to>
-                                    </p:set>
-                                  </p:childTnLst>
-                                </p:cTn>
-                              </p:par>
-                            </p:childTnLst>
-                          </p:cTn>
-                        </p:par>
-                      </p:childTnLst>
-                    </p:cTn>
-                  </p:par>
-                  <p:par>
-                    <p:cTn id="11" fill="hold">
-                      <p:stCondLst>
-                        <p:cond delay="indefinite"/>
-                      </p:stCondLst>
-                      <p:childTnLst>
-                        <p:par>
-                          <p:cTn id="12" fill="hold">
-                            <p:stCondLst>
-                              <p:cond delay="0"/>
-                            </p:stCondLst>
-                            <p:childTnLst>
-                              <p:par>
-                                <p:cTn id="13" presetID="1" presetClass="entr" presetSubtype="0" fill="hold" nodeType="clickEffect">
-                                  <p:stCondLst>
-                                    <p:cond delay="0"/>
-                                  </p:stCondLst>
-                                  <p:childTnLst>
-                                    <p:set>
-                                      <p:cBhvr>
-                                        <p:cTn id="14" dur="1" fill="hold">
-                                          <p:stCondLst>
-                                            <p:cond delay="0"/>
-                                          </p:stCondLst>
-                                        </p:cTn>
-                                        <p:tgtEl>
-                                          <p:spTgt spid="9"/>
-                                        </p:tgtEl>
-                                        <p:attrNameLst>
-                                          <p:attrName>style.visibility</p:attrName>
-                                        </p:attrNameLst>
-                                      </p:cBhvr>
-                                      <p:to>
-                                        <p:strVal val="visible"/>
-                                      </p:to>
-                                    </p:set>
-                                  </p:childTnLst>
-                                </p:cTn>
-                              </p:par>
-                            </p:childTnLst>
-                          </p:cTn>
-                        </p:par>
-                      </p:childTnLst>
-                    </p:cTn>
-                  </p:par>
-                  <p:par>
-                    <p:cTn id="15" fill="hold">
-                      <p:stCondLst>
-                        <p:cond delay="indefinite"/>
-                      </p:stCondLst>
-                      <p:childTnLst>
-                        <p:par>
-                          <p:cTn id="16" fill="hold">
-                            <p:stCondLst>
-                              <p:cond delay="0"/>
-                            </p:stCondLst>
-                            <p:childTnLst>
-                              <p:par>
-                                <p:cTn id="17" presetID="1" presetClass="exit" presetSubtype="0" fill="hold" nodeType="clickEffect">
-                                  <p:stCondLst>
-                                    <p:cond delay="0"/>
-                                  </p:stCondLst>
-                                  <p:childTnLst>
-                                    <p:set>
-                                      <p:cBhvr>
-                                        <p:cTn id="18" dur="1" fill="hold">
-                                          <p:stCondLst>
-                                            <p:cond delay="0"/>
-                                          </p:stCondLst>
-                                        </p:cTn>
-                                        <p:tgtEl>
-                                          <p:spTgt spid="9"/>
-                                        </p:tgtEl>
-                                        <p:attrNameLst>
-                                          <p:attrName>style.visibility</p:attrName>
-                                        </p:attrNameLst>
-                                      </p:cBhvr>
-                                      <p:to>
-                                        <p:strVal val="hidden"/>
-                                      </p:to>
-                                    </p:set>
-                                  </p:childTnLst>
-                                </p:cTn>
-                              </p:par>
-                            </p:childTnLst>
-                          </p:cTn>
-                        </p:par>
-                      </p:childTnLst>
-                    </p:cTn>
-                  </p:par>
-                  <p:par>
-                    <p:cTn id="19" fill="hold">
-                      <p:stCondLst>
-                        <p:cond delay="indefinite"/>
-                      </p:stCondLst>
-                      <p:childTnLst>
-                        <p:par>
-                          <p:cTn id="20" fill="hold">
-                            <p:stCondLst>
-                              <p:cond delay="0"/>
-                            </p:stCondLst>
-                            <p:childTnLst>
-                              <p:par>
-                                <p:cTn id="21" presetID="1" presetClass="entr" presetSubtype="0" fill="hold" nodeType="clickEffect">
-                                  <p:stCondLst>
-                                    <p:cond delay="0"/>
-                                  </p:stCondLst>
-                                  <p:childTnLst>
-                                    <p:set>
-                                      <p:cBhvr>
-                                        <p:cTn id="22" dur="1" fill="hold">
-                                          <p:stCondLst>
-                                            <p:cond delay="0"/>
-                                          </p:stCondLst>
-                                        </p:cTn>
-                                        <p:tgtEl>
-                                          <p:spTgt spid="11"/>
-                                        </p:tgtEl>
-                                        <p:attrNameLst>
-                                          <p:attrName>style.visibility</p:attrName>
-                                        </p:attrNameLst>
-                                      </p:cBhvr>
-                                      <p:to>
-                                        <p:strVal val="visible"/>
-                                      </p:to>
-                                    </p:set>
-                                  </p:childTnLst>
-                                </p:cTn>
-                              </p:par>
-                            </p:childTnLst>
-                          </p:cTn>
-                        </p:par>
-                      </p:childTnLst>
-                    </p:cTn>
-                  </p:par>
-                  <p:par>
-                    <p:cTn id="23" fill="hold">
-                      <p:stCondLst>
-                        <p:cond delay="indefinite"/>
-                      </p:stCondLst>
-                      <p:childTnLst>
-                        <p:par>
-                          <p:cTn id="24" fill="hold">
-                            <p:stCondLst>
-                              <p:cond delay="0"/>
-                            </p:stCondLst>
-                            <p:childTnLst>
-                              <p:par>
-                                <p:cTn id="25" presetID="1" presetClass="exit" presetSubtype="0" fill="hold" nodeType="clickEffect">
-                                  <p:stCondLst>
-                                    <p:cond delay="0"/>
-                                  </p:stCondLst>
-                                  <p:childTnLst>
-                                    <p:set>
-                                      <p:cBhvr>
-                                        <p:cTn id="26" dur="1" fill="hold">
-                                          <p:stCondLst>
-                                            <p:cond delay="0"/>
-                                          </p:stCondLst>
-                                        </p:cTn>
-                                        <p:tgtEl>
-                                          <p:spTgt spid="11"/>
-                                        </p:tgtEl>
-                                        <p:attrNameLst>
-                                          <p:attrName>style.visibility</p:attrName>
-                                        </p:attrNameLst>
-                                      </p:cBhvr>
-                                      <p:to>
-                                        <p:strVal val="hidden"/>
-                                      </p:to>
-                                    </p:set>
-                                  </p:childTnLst>
-                                </p:cTn>
-                              </p:par>
-                            </p:childTnLst>
-                          </p:cTn>
-                        </p:par>
-                      </p:childTnLst>
-                    </p:cTn>
-                  </p:par>
-                  <p:par>
-                    <p:cTn id="27" fill="hold">
-                      <p:stCondLst>
-                        <p:cond delay="indefinite"/>
-                      </p:stCondLst>
-                      <p:childTnLst>
-                        <p:par>
-                          <p:cTn id="28" fill="hold">
-                            <p:stCondLst>
-                              <p:cond delay="0"/>
-                            </p:stCondLst>
-                            <p:childTnLst>
-                              <p:par>
-                                <p:cTn id="29" presetID="1" presetClass="entr" presetSubtype="0" fill="hold" nodeType="clickEffect">
-                                  <p:stCondLst>
-                                    <p:cond delay="0"/>
-                                  </p:stCondLst>
-                                  <p:childTnLst>
-                                    <p:set>
-                                      <p:cBhvr>
-                                        <p:cTn id="30" dur="1" fill="hold">
-                                          <p:stCondLst>
-                                            <p:cond delay="0"/>
-                                          </p:stCondLst>
-                                        </p:cTn>
-                                        <p:tgtEl>
-                                          <p:spTgt spid="12"/>
-                                        </p:tgtEl>
-                                        <p:attrNameLst>
-                                          <p:attrName>style.visibility</p:attrName>
-                                        </p:attrNameLst>
-                                      </p:cBhvr>
-                                      <p:to>
-                                        <p:strVal val="visible"/>
-                                      </p:to>
-                                    </p:set>
-                                  </p:childTnLst>
-                                </p:cTn>
-                              </p:par>
-                            </p:childTnLst>
-                          </p:cTn>
-                        </p:par>
-                      </p:childTnLst>
-                    </p:cTn>
-                  </p:par>
-                  <p:par>
-                    <p:cTn id="31" fill="hold">
-                      <p:stCondLst>
-                        <p:cond delay="indefinite"/>
-                      </p:stCondLst>
-                      <p:childTnLst>
-                        <p:par>
-                          <p:cTn id="32" fill="hold">
-                            <p:stCondLst>
-                              <p:cond delay="0"/>
-                            </p:stCondLst>
-                            <p:childTnLst>
-                              <p:par>
-                                <p:cTn id="33" presetID="1" presetClass="exit" presetSubtype="0" fill="hold" nodeType="clickEffect">
-                                  <p:stCondLst>
-                                    <p:cond delay="0"/>
-                                  </p:stCondLst>
-                                  <p:childTnLst>
-                                    <p:set>
-                                      <p:cBhvr>
-                                        <p:cTn id="34" dur="1" fill="hold">
-                                          <p:stCondLst>
-                                            <p:cond delay="0"/>
-                                          </p:stCondLst>
-                                        </p:cTn>
-                                        <p:tgtEl>
-                                          <p:spTgt spid="12"/>
-                                        </p:tgtEl>
-                                        <p:attrNameLst>
-                                          <p:attrName>style.visibility</p:attrName>
-                                        </p:attrNameLst>
-                                      </p:cBhvr>
-                                      <p:to>
-                                        <p:strVal val="hidden"/>
-                                      </p:to>
-                                    </p:set>
-                                  </p:childTnLst>
-                                </p:cTn>
-                              </p:par>
-                            </p:childTnLst>
-                          </p:cTn>
-                        </p:par>
-                      </p:childTnLst>
-                    </p:cTn>
-                  </p:par>
-                  <p:par>
-                    <p:cTn id="35" fill="hold">
-                      <p:stCondLst>
-                        <p:cond delay="indefinite"/>
-                      </p:stCondLst>
-                      <p:childTnLst>
-                        <p:par>
-                          <p:cTn id="36" fill="hold">
-                            <p:stCondLst>
-                              <p:cond delay="0"/>
-                            </p:stCondLst>
-                            <p:childTnLst>
-                              <p:par>
-                                <p:cTn id="37" presetID="1" presetClass="entr" presetSubtype="0" fill="hold" nodeType="clickEffect">
-                                  <p:stCondLst>
-                                    <p:cond delay="0"/>
-                                  </p:stCondLst>
-                                  <p:childTnLst>
-                                    <p:set>
-                                      <p:cBhvr>
-                                        <p:cTn id="38" dur="1" fill="hold">
-                                          <p:stCondLst>
-                                            <p:cond delay="0"/>
-                                          </p:stCondLst>
-                                        </p:cTn>
-                                        <p:tgtEl>
-                                          <p:spTgt spid="13"/>
-                                        </p:tgtEl>
-                                        <p:attrNameLst>
-                                          <p:attrName>style.visibility</p:attrName>
-                                        </p:attrNameLst>
-                                      </p:cBhvr>
-                                      <p:to>
-                                        <p:strVal val="visible"/>
-                                      </p:to>
-                                    </p:set>
-                                  </p:childTnLst>
-                                </p:cTn>
-                              </p:par>
-                            </p:childTnLst>
-                          </p:cTn>
-                        </p:par>
-                      </p:childTnLst>
-                    </p:cTn>
-                  </p:par>
-                </p:childTnLst>
-              </p:cTn>
-              <p:prevCondLst>
-                <p:cond evt="onPrev" delay="0">
-                  <p:tgtEl>
-                    <p:sldTgt/>
-                  </p:tgtEl>
-                </p:cond>
-              </p:prevCondLst>
-              <p:nextCondLst>
-                <p:cond evt="onNext" delay="0">
-                  <p:tgtEl>
-                    <p:sldTgt/>
-                  </p:tgtEl>
-                </p:cond>
-              </p:nextCondLst>
-            </p:seq>
-          </p:childTnLst>
-        </p:cTn>
-      </p:par>
-    </p:tnLst>
-  </p:timing>
-</p:sld>
-</file>
-
-<file path=ppt/slides/slide8.xml><?xml version="1.0" encoding="utf-8"?>
-<p:sld xmlns:a="http://schemas.openxmlformats.org/drawingml/2006/main" xmlns:r="http://schemas.openxmlformats.org/officeDocument/2006/relationships" xmlns:p="http://schemas.openxmlformats.org/presentationml/2006/main">
-  <p:cSld>
-    <p:spTree>
-      <p:nvGrpSpPr>
-        <p:cNvPr id="1" name=""/>
-        <p:cNvGrpSpPr/>
-        <p:nvPr/>
-      </p:nvGrpSpPr>
-      <p:grpSpPr>
-        <a:xfrm>
-          <a:off x="0" y="0"/>
-          <a:ext cx="0" cy="0"/>
-          <a:chOff x="0" y="0"/>
-          <a:chExt cx="0" cy="0"/>
-        </a:xfrm>
-      </p:grpSpPr>
-      <p:sp>
-        <p:nvSpPr>
-          <p:cNvPr id="2" name="Title 1"/>
-          <p:cNvSpPr>
-            <a:spLocks noGrp="1"/>
-          </p:cNvSpPr>
-          <p:nvPr>
-            <p:ph type="title"/>
-          </p:nvPr>
-        </p:nvSpPr>
-        <p:spPr>
-          <a:xfrm>
-            <a:off x="608012" y="5257800"/>
-            <a:ext cx="11430000" cy="1066800"/>
-          </a:xfrm>
-        </p:spPr>
-        <p:txBody>
-          <a:bodyPr/>
-          <a:lstStyle/>
-          <a:p>
-            <a:r>
-              <a:rPr lang="en-US" dirty="0"/>
-              <a:t>How to get started? (Become familiar with DSC)</a:t>
-            </a:r>
-          </a:p>
-        </p:txBody>
-      </p:sp>
-      <p:pic>
-        <p:nvPicPr>
-          <p:cNvPr id="7" name="Picture 6">
-            <a:extLst>
-              <a:ext uri="{FF2B5EF4-FFF2-40B4-BE49-F238E27FC236}">
-                <a16:creationId xmlns:a16="http://schemas.microsoft.com/office/drawing/2014/main" id="{82A14CD9-CCE0-4645-ACCD-D3A74874AF7B}"/>
-              </a:ext>
-            </a:extLst>
-          </p:cNvPr>
-          <p:cNvPicPr>
-            <a:picLocks noChangeAspect="1"/>
-          </p:cNvPicPr>
-          <p:nvPr/>
-        </p:nvPicPr>
-        <p:blipFill>
-          <a:blip r:embed="rId2"/>
-          <a:stretch>
-            <a:fillRect/>
-          </a:stretch>
-        </p:blipFill>
-        <p:spPr>
-          <a:xfrm>
-            <a:off x="655638" y="685800"/>
-            <a:ext cx="11000886" cy="4724400"/>
-          </a:xfrm>
-          <a:prstGeom prst="rect">
-            <a:avLst/>
-          </a:prstGeom>
-        </p:spPr>
-      </p:pic>
-    </p:spTree>
-    <p:extLst>
-      <p:ext uri="{BB962C8B-B14F-4D97-AF65-F5344CB8AC3E}">
-        <p14:creationId xmlns:p14="http://schemas.microsoft.com/office/powerpoint/2010/main" val="3997117863"/>
-      </p:ext>
-    </p:extLst>
-  </p:cSld>
-  <p:clrMapOvr>
-    <a:masterClrMapping/>
-  </p:clrMapOvr>
-  <mc:AlternateContent xmlns:mc="http://schemas.openxmlformats.org/markup-compatibility/2006" xmlns:p14="http://schemas.microsoft.com/office/powerpoint/2010/main">
-    <mc:Choice Requires="p14">
-      <p:transition spd="med" p14:dur="700">
-        <p:fade/>
-      </p:transition>
-    </mc:Choice>
-    <mc:Fallback xmlns="">
-      <p:transition spd="med">
-        <p:fade/>
-      </p:transition>
-    </mc:Fallback>
-  </mc:AlternateContent>
-</p:sld>
-</file>
-
-<file path=ppt/slides/slide9.xml><?xml version="1.0" encoding="utf-8"?>
 <p:sld xmlns:a="http://schemas.openxmlformats.org/drawingml/2006/main" xmlns:r="http://schemas.openxmlformats.org/officeDocument/2006/relationships" xmlns:p="http://schemas.openxmlformats.org/presentationml/2006/main">
   <p:cSld>
     <p:spTree>
@@ -11107,6 +9084,2134 @@
       </p:par>
     </p:tnLst>
   </p:timing>
+</p:sld>
+</file>
+
+<file path=ppt/slides/slide11.xml><?xml version="1.0" encoding="utf-8"?>
+<p:sld xmlns:a="http://schemas.openxmlformats.org/drawingml/2006/main" xmlns:r="http://schemas.openxmlformats.org/officeDocument/2006/relationships" xmlns:p="http://schemas.openxmlformats.org/presentationml/2006/main">
+  <p:cSld>
+    <p:spTree>
+      <p:nvGrpSpPr>
+        <p:cNvPr id="1" name=""/>
+        <p:cNvGrpSpPr/>
+        <p:nvPr/>
+      </p:nvGrpSpPr>
+      <p:grpSpPr>
+        <a:xfrm>
+          <a:off x="0" y="0"/>
+          <a:ext cx="0" cy="0"/>
+          <a:chOff x="0" y="0"/>
+          <a:chExt cx="0" cy="0"/>
+        </a:xfrm>
+      </p:grpSpPr>
+      <p:sp>
+        <p:nvSpPr>
+          <p:cNvPr id="2" name="Title 1"/>
+          <p:cNvSpPr>
+            <a:spLocks noGrp="1"/>
+          </p:cNvSpPr>
+          <p:nvPr>
+            <p:ph type="title"/>
+          </p:nvPr>
+        </p:nvSpPr>
+        <p:spPr>
+          <a:xfrm>
+            <a:off x="455612" y="5257800"/>
+            <a:ext cx="10971372" cy="1066800"/>
+          </a:xfrm>
+        </p:spPr>
+        <p:txBody>
+          <a:bodyPr/>
+          <a:lstStyle/>
+          <a:p>
+            <a:r>
+              <a:rPr lang="en-US" dirty="0"/>
+              <a:t>Questions?</a:t>
+            </a:r>
+          </a:p>
+        </p:txBody>
+      </p:sp>
+      <p:sp>
+        <p:nvSpPr>
+          <p:cNvPr id="3" name="Content Placeholder 2"/>
+          <p:cNvSpPr>
+            <a:spLocks noGrp="1"/>
+          </p:cNvSpPr>
+          <p:nvPr>
+            <p:ph sz="half" idx="1"/>
+          </p:nvPr>
+        </p:nvSpPr>
+        <p:spPr>
+          <a:xfrm>
+            <a:off x="609440" y="685800"/>
+            <a:ext cx="9828372" cy="5029200"/>
+          </a:xfrm>
+        </p:spPr>
+        <p:txBody>
+          <a:bodyPr>
+            <a:normAutofit/>
+          </a:bodyPr>
+          <a:lstStyle/>
+          <a:p>
+            <a:pPr marL="0" indent="0">
+              <a:buNone/>
+            </a:pPr>
+            <a:r>
+              <a:rPr lang="en-US" dirty="0"/>
+              <a:t>Links</a:t>
+            </a:r>
+          </a:p>
+          <a:p>
+            <a:pPr>
+              <a:buFontTx/>
+              <a:buChar char="-"/>
+            </a:pPr>
+            <a:r>
+              <a:rPr lang="en-US" dirty="0"/>
+              <a:t>Sample projects</a:t>
+            </a:r>
+          </a:p>
+          <a:p>
+            <a:pPr lvl="1">
+              <a:buFontTx/>
+              <a:buChar char="-"/>
+            </a:pPr>
+            <a:r>
+              <a:rPr lang="en-US" dirty="0"/>
+              <a:t>https://github.com/brwilkinson/AzureDeploymentFramework</a:t>
+            </a:r>
+          </a:p>
+          <a:p>
+            <a:pPr>
+              <a:buFontTx/>
+              <a:buChar char="-"/>
+            </a:pPr>
+            <a:r>
+              <a:rPr lang="en-US" dirty="0"/>
+              <a:t>Template Information</a:t>
+            </a:r>
+          </a:p>
+          <a:p>
+            <a:pPr lvl="1">
+              <a:buFontTx/>
+              <a:buChar char="-"/>
+            </a:pPr>
+            <a:r>
+              <a:rPr lang="en-US" dirty="0">
+                <a:hlinkClick r:id="rId2"/>
+              </a:rPr>
+              <a:t>https://docs.microsoft.com/en-us/azure/templates/</a:t>
+            </a:r>
+            <a:r>
+              <a:rPr lang="en-US" dirty="0"/>
+              <a:t> </a:t>
+            </a:r>
+          </a:p>
+          <a:p>
+            <a:pPr>
+              <a:buFontTx/>
+              <a:buChar char="-"/>
+            </a:pPr>
+            <a:r>
+              <a:rPr lang="en-US" dirty="0"/>
+              <a:t>Feel free to reach out directly for other private projects</a:t>
+            </a:r>
+          </a:p>
+          <a:p>
+            <a:pPr lvl="1">
+              <a:buFontTx/>
+              <a:buChar char="-"/>
+            </a:pPr>
+            <a:r>
+              <a:rPr lang="en-US" dirty="0"/>
+              <a:t>Assistance with Templates /  DSC / PowerShell</a:t>
+            </a:r>
+          </a:p>
+          <a:p>
+            <a:pPr>
+              <a:buFontTx/>
+              <a:buChar char="-"/>
+            </a:pPr>
+            <a:r>
+              <a:rPr lang="en-US" dirty="0"/>
+              <a:t>All feedback is welcome . . . The ADF is always changing. </a:t>
+            </a:r>
+          </a:p>
+          <a:p>
+            <a:pPr>
+              <a:buFontTx/>
+              <a:buChar char="-"/>
+            </a:pPr>
+            <a:endParaRPr lang="en-US" dirty="0"/>
+          </a:p>
+          <a:p>
+            <a:pPr>
+              <a:buFontTx/>
+              <a:buChar char="-"/>
+            </a:pPr>
+            <a:endParaRPr lang="en-US" dirty="0"/>
+          </a:p>
+        </p:txBody>
+      </p:sp>
+    </p:spTree>
+    <p:extLst>
+      <p:ext uri="{BB962C8B-B14F-4D97-AF65-F5344CB8AC3E}">
+        <p14:creationId xmlns:p14="http://schemas.microsoft.com/office/powerpoint/2010/main" val="1280870235"/>
+      </p:ext>
+    </p:extLst>
+  </p:cSld>
+  <p:clrMapOvr>
+    <a:masterClrMapping/>
+  </p:clrMapOvr>
+  <mc:AlternateContent xmlns:mc="http://schemas.openxmlformats.org/markup-compatibility/2006" xmlns:p14="http://schemas.microsoft.com/office/powerpoint/2010/main">
+    <mc:Choice Requires="p14">
+      <p:transition spd="med" p14:dur="700">
+        <p:fade/>
+      </p:transition>
+    </mc:Choice>
+    <mc:Fallback xmlns="">
+      <p:transition spd="med">
+        <p:fade/>
+      </p:transition>
+    </mc:Fallback>
+  </mc:AlternateContent>
+</p:sld>
+</file>
+
+<file path=ppt/slides/slide2.xml><?xml version="1.0" encoding="utf-8"?>
+<p:sld xmlns:a="http://schemas.openxmlformats.org/drawingml/2006/main" xmlns:r="http://schemas.openxmlformats.org/officeDocument/2006/relationships" xmlns:p="http://schemas.openxmlformats.org/presentationml/2006/main">
+  <p:cSld>
+    <p:spTree>
+      <p:nvGrpSpPr>
+        <p:cNvPr id="1" name=""/>
+        <p:cNvGrpSpPr/>
+        <p:nvPr/>
+      </p:nvGrpSpPr>
+      <p:grpSpPr>
+        <a:xfrm>
+          <a:off x="0" y="0"/>
+          <a:ext cx="0" cy="0"/>
+          <a:chOff x="0" y="0"/>
+          <a:chExt cx="0" cy="0"/>
+        </a:xfrm>
+      </p:grpSpPr>
+      <p:sp>
+        <p:nvSpPr>
+          <p:cNvPr id="2" name="Title 1"/>
+          <p:cNvSpPr>
+            <a:spLocks noGrp="1"/>
+          </p:cNvSpPr>
+          <p:nvPr>
+            <p:ph type="title"/>
+          </p:nvPr>
+        </p:nvSpPr>
+        <p:spPr/>
+        <p:txBody>
+          <a:bodyPr/>
+          <a:lstStyle/>
+          <a:p>
+            <a:r>
+              <a:rPr lang="en-US" dirty="0"/>
+              <a:t>What is ADF?</a:t>
+            </a:r>
+          </a:p>
+        </p:txBody>
+      </p:sp>
+      <p:sp>
+        <p:nvSpPr>
+          <p:cNvPr id="3" name="Content Placeholder 2"/>
+          <p:cNvSpPr>
+            <a:spLocks noGrp="1"/>
+          </p:cNvSpPr>
+          <p:nvPr>
+            <p:ph idx="13"/>
+          </p:nvPr>
+        </p:nvSpPr>
+        <p:spPr>
+          <a:xfrm>
+            <a:off x="1293812" y="685801"/>
+            <a:ext cx="10287000" cy="4800599"/>
+          </a:xfrm>
+        </p:spPr>
+        <p:txBody>
+          <a:bodyPr>
+            <a:normAutofit/>
+          </a:bodyPr>
+          <a:lstStyle/>
+          <a:p>
+            <a:r>
+              <a:rPr lang="en-US" dirty="0"/>
+              <a:t>A </a:t>
+            </a:r>
+            <a:r>
+              <a:rPr lang="en-US" dirty="0">
+                <a:solidFill>
+                  <a:srgbClr val="7030A0"/>
+                </a:solidFill>
+              </a:rPr>
+              <a:t>declarative</a:t>
+            </a:r>
+            <a:r>
+              <a:rPr lang="en-US" dirty="0"/>
+              <a:t> way to build Cloud Infrastructure and Services.</a:t>
+            </a:r>
+          </a:p>
+          <a:p>
+            <a:r>
+              <a:rPr lang="en-US" dirty="0"/>
+              <a:t>Combines two common </a:t>
+            </a:r>
+            <a:r>
+              <a:rPr lang="en-US" dirty="0">
+                <a:solidFill>
+                  <a:srgbClr val="7030A0"/>
+                </a:solidFill>
+              </a:rPr>
+              <a:t>idempotent</a:t>
+            </a:r>
+            <a:r>
+              <a:rPr lang="en-US" dirty="0"/>
+              <a:t> technologies for Automation</a:t>
+            </a:r>
+          </a:p>
+          <a:p>
+            <a:r>
+              <a:rPr lang="en-US" dirty="0">
+                <a:solidFill>
+                  <a:srgbClr val="7030A0"/>
+                </a:solidFill>
+              </a:rPr>
+              <a:t>Infrastructure</a:t>
+            </a:r>
+            <a:r>
+              <a:rPr lang="en-US" dirty="0"/>
+              <a:t> as Code:</a:t>
+            </a:r>
+          </a:p>
+          <a:p>
+            <a:pPr lvl="1"/>
+            <a:r>
+              <a:rPr lang="en-US" dirty="0"/>
+              <a:t>Azure Resource Manager (</a:t>
+            </a:r>
+            <a:r>
+              <a:rPr lang="en-US" b="1" dirty="0"/>
+              <a:t>ARM</a:t>
+            </a:r>
+            <a:r>
+              <a:rPr lang="en-US" dirty="0"/>
+              <a:t>) Deployment Templates</a:t>
+            </a:r>
+          </a:p>
+          <a:p>
+            <a:pPr marL="228600" lvl="1" indent="-228600">
+              <a:spcBef>
+                <a:spcPts val="1800"/>
+              </a:spcBef>
+              <a:buClr>
+                <a:schemeClr val="tx1"/>
+              </a:buClr>
+              <a:buFont typeface="Arial" pitchFamily="34" charset="0"/>
+              <a:buChar char="•"/>
+            </a:pPr>
+            <a:r>
+              <a:rPr lang="en-US" sz="2800" dirty="0">
+                <a:solidFill>
+                  <a:srgbClr val="7030A0"/>
+                </a:solidFill>
+              </a:rPr>
+              <a:t>Configuration</a:t>
+            </a:r>
+            <a:r>
+              <a:rPr lang="en-US" sz="2800" dirty="0"/>
+              <a:t> as Code:</a:t>
+            </a:r>
+          </a:p>
+          <a:p>
+            <a:pPr lvl="1"/>
+            <a:r>
+              <a:rPr lang="en-US" dirty="0"/>
+              <a:t>PowerShell Desired State Configuration (</a:t>
+            </a:r>
+            <a:r>
+              <a:rPr lang="en-US" b="1" dirty="0"/>
+              <a:t>DSC</a:t>
+            </a:r>
+            <a:r>
+              <a:rPr lang="en-US" dirty="0"/>
+              <a:t>)</a:t>
+            </a:r>
+          </a:p>
+          <a:p>
+            <a:pPr marL="228600" lvl="1" indent="-228600">
+              <a:spcBef>
+                <a:spcPts val="1800"/>
+              </a:spcBef>
+              <a:buClr>
+                <a:schemeClr val="tx1"/>
+              </a:buClr>
+              <a:buFont typeface="Arial" pitchFamily="34" charset="0"/>
+              <a:buChar char="•"/>
+            </a:pPr>
+            <a:r>
+              <a:rPr lang="en-US" sz="2800" dirty="0"/>
+              <a:t>Follows a DevOps mindset for Deployment</a:t>
+            </a:r>
+          </a:p>
+          <a:p>
+            <a:pPr marL="228600" lvl="1" indent="-228600">
+              <a:spcBef>
+                <a:spcPts val="1800"/>
+              </a:spcBef>
+              <a:buClr>
+                <a:schemeClr val="tx1"/>
+              </a:buClr>
+              <a:buFont typeface="Arial" pitchFamily="34" charset="0"/>
+              <a:buChar char="•"/>
+            </a:pPr>
+            <a:r>
+              <a:rPr lang="en-US" sz="2800" dirty="0"/>
+              <a:t>Useful for </a:t>
+            </a:r>
+            <a:r>
+              <a:rPr lang="en-US" sz="2800" b="1" dirty="0"/>
+              <a:t>IaaS</a:t>
+            </a:r>
+            <a:r>
+              <a:rPr lang="en-US" sz="2800" dirty="0"/>
+              <a:t> </a:t>
+            </a:r>
+            <a:r>
+              <a:rPr lang="en-US" sz="2800" dirty="0">
+                <a:solidFill>
+                  <a:srgbClr val="7030A0"/>
+                </a:solidFill>
+              </a:rPr>
+              <a:t>or</a:t>
+            </a:r>
+            <a:r>
+              <a:rPr lang="en-US" sz="2800" dirty="0"/>
+              <a:t> </a:t>
+            </a:r>
+            <a:r>
+              <a:rPr lang="en-US" sz="2800" b="1" dirty="0"/>
+              <a:t>PaaS</a:t>
+            </a:r>
+            <a:r>
+              <a:rPr lang="en-US" sz="2800" dirty="0"/>
+              <a:t> services </a:t>
+            </a:r>
+            <a:r>
+              <a:rPr lang="en-US" sz="2800" dirty="0">
+                <a:solidFill>
+                  <a:srgbClr val="7030A0"/>
+                </a:solidFill>
+              </a:rPr>
+              <a:t>+</a:t>
+            </a:r>
+            <a:r>
+              <a:rPr lang="en-US" sz="2800" dirty="0"/>
+              <a:t> monitoring </a:t>
+            </a:r>
+            <a:r>
+              <a:rPr lang="en-US" sz="2800" dirty="0">
+                <a:solidFill>
+                  <a:srgbClr val="7030A0"/>
+                </a:solidFill>
+              </a:rPr>
+              <a:t>+</a:t>
+            </a:r>
+            <a:r>
+              <a:rPr lang="en-US" sz="2800" dirty="0"/>
+              <a:t> security </a:t>
+            </a:r>
+            <a:r>
+              <a:rPr lang="en-US" sz="2800" dirty="0">
+                <a:solidFill>
+                  <a:srgbClr val="7030A0"/>
+                </a:solidFill>
+              </a:rPr>
+              <a:t>+ +</a:t>
+            </a:r>
+          </a:p>
+          <a:p>
+            <a:pPr lvl="1"/>
+            <a:endParaRPr lang="en-US" dirty="0"/>
+          </a:p>
+        </p:txBody>
+      </p:sp>
+    </p:spTree>
+    <p:extLst>
+      <p:ext uri="{BB962C8B-B14F-4D97-AF65-F5344CB8AC3E}">
+        <p14:creationId xmlns:p14="http://schemas.microsoft.com/office/powerpoint/2010/main" val="379348850"/>
+      </p:ext>
+    </p:extLst>
+  </p:cSld>
+  <p:clrMapOvr>
+    <a:masterClrMapping/>
+  </p:clrMapOvr>
+  <mc:AlternateContent xmlns:mc="http://schemas.openxmlformats.org/markup-compatibility/2006" xmlns:p14="http://schemas.microsoft.com/office/powerpoint/2010/main">
+    <mc:Choice Requires="p14">
+      <p:transition spd="med" p14:dur="700">
+        <p:fade/>
+      </p:transition>
+    </mc:Choice>
+    <mc:Fallback xmlns="">
+      <p:transition spd="med">
+        <p:fade/>
+      </p:transition>
+    </mc:Fallback>
+  </mc:AlternateContent>
+</p:sld>
+</file>
+
+<file path=ppt/slides/slide3.xml><?xml version="1.0" encoding="utf-8"?>
+<p:sld xmlns:a="http://schemas.openxmlformats.org/drawingml/2006/main" xmlns:r="http://schemas.openxmlformats.org/officeDocument/2006/relationships" xmlns:p="http://schemas.openxmlformats.org/presentationml/2006/main">
+  <p:cSld>
+    <p:spTree>
+      <p:nvGrpSpPr>
+        <p:cNvPr id="1" name=""/>
+        <p:cNvGrpSpPr/>
+        <p:nvPr/>
+      </p:nvGrpSpPr>
+      <p:grpSpPr>
+        <a:xfrm>
+          <a:off x="0" y="0"/>
+          <a:ext cx="0" cy="0"/>
+          <a:chOff x="0" y="0"/>
+          <a:chExt cx="0" cy="0"/>
+        </a:xfrm>
+      </p:grpSpPr>
+      <p:sp>
+        <p:nvSpPr>
+          <p:cNvPr id="2" name="Title 1"/>
+          <p:cNvSpPr>
+            <a:spLocks noGrp="1"/>
+          </p:cNvSpPr>
+          <p:nvPr>
+            <p:ph type="title"/>
+          </p:nvPr>
+        </p:nvSpPr>
+        <p:spPr>
+          <a:xfrm>
+            <a:off x="608012" y="5410200"/>
+            <a:ext cx="10971372" cy="1066800"/>
+          </a:xfrm>
+        </p:spPr>
+        <p:txBody>
+          <a:bodyPr/>
+          <a:lstStyle/>
+          <a:p>
+            <a:r>
+              <a:rPr lang="en-US" dirty="0"/>
+              <a:t>Why use ADF?</a:t>
+            </a:r>
+          </a:p>
+        </p:txBody>
+      </p:sp>
+      <p:sp>
+        <p:nvSpPr>
+          <p:cNvPr id="3" name="Content Placeholder 2"/>
+          <p:cNvSpPr>
+            <a:spLocks noGrp="1"/>
+          </p:cNvSpPr>
+          <p:nvPr>
+            <p:ph idx="13"/>
+          </p:nvPr>
+        </p:nvSpPr>
+        <p:spPr>
+          <a:xfrm>
+            <a:off x="1141412" y="381001"/>
+            <a:ext cx="10287000" cy="5791199"/>
+          </a:xfrm>
+        </p:spPr>
+        <p:txBody>
+          <a:bodyPr>
+            <a:normAutofit/>
+          </a:bodyPr>
+          <a:lstStyle/>
+          <a:p>
+            <a:r>
+              <a:rPr lang="en-US" dirty="0"/>
+              <a:t>The focus of the toolkit is the initial training (ramp up) and allows the customer to </a:t>
+            </a:r>
+            <a:r>
+              <a:rPr lang="en-US" b="1" dirty="0"/>
+              <a:t>get to production </a:t>
+            </a:r>
+            <a:r>
+              <a:rPr lang="en-US" dirty="0"/>
+              <a:t>in Azure faster/efficiently.</a:t>
+            </a:r>
+          </a:p>
+          <a:p>
+            <a:r>
+              <a:rPr lang="en-US" dirty="0"/>
+              <a:t>By using </a:t>
+            </a:r>
+            <a:r>
+              <a:rPr lang="en-US" u="sng" dirty="0"/>
+              <a:t>Infrastructure</a:t>
+            </a:r>
+            <a:r>
+              <a:rPr lang="en-US" dirty="0"/>
+              <a:t> and </a:t>
+            </a:r>
+            <a:r>
+              <a:rPr lang="en-US" u="sng" dirty="0"/>
+              <a:t>Configuration</a:t>
+            </a:r>
+            <a:r>
+              <a:rPr lang="en-US" dirty="0"/>
+              <a:t> as Code</a:t>
+            </a:r>
+            <a:endParaRPr lang="en-US" sz="2400" dirty="0"/>
+          </a:p>
+          <a:p>
+            <a:pPr lvl="1"/>
+            <a:r>
+              <a:rPr lang="en-US" dirty="0"/>
+              <a:t>All code is checked into source control</a:t>
+            </a:r>
+          </a:p>
+          <a:p>
+            <a:pPr lvl="2"/>
+            <a:r>
+              <a:rPr lang="en-US" dirty="0"/>
+              <a:t>Promotes teamwork</a:t>
+            </a:r>
+          </a:p>
+          <a:p>
+            <a:pPr lvl="2"/>
+            <a:r>
+              <a:rPr lang="en-US" dirty="0"/>
+              <a:t>Easy sharing of code between the team</a:t>
+            </a:r>
+          </a:p>
+          <a:p>
+            <a:pPr lvl="2"/>
+            <a:r>
+              <a:rPr lang="en-US" dirty="0"/>
+              <a:t>Allows ongoing support for the customer throughout the application lifecycle</a:t>
+            </a:r>
+          </a:p>
+          <a:p>
+            <a:pPr lvl="1"/>
+            <a:r>
+              <a:rPr lang="en-US" dirty="0"/>
+              <a:t>Documentation as Code</a:t>
+            </a:r>
+          </a:p>
+          <a:p>
+            <a:r>
+              <a:rPr lang="en-US" dirty="0"/>
+              <a:t>We use the exact same code for the full application lifecycle</a:t>
+            </a:r>
+          </a:p>
+          <a:p>
+            <a:pPr marL="330200" lvl="1" indent="0">
+              <a:buNone/>
+            </a:pPr>
+            <a:r>
+              <a:rPr lang="en-US" dirty="0"/>
+              <a:t>  Development </a:t>
+            </a:r>
+            <a:r>
+              <a:rPr lang="en-US" dirty="0">
+                <a:sym typeface="Wingdings" panose="05000000000000000000" pitchFamily="2" charset="2"/>
+              </a:rPr>
+              <a:t></a:t>
+            </a:r>
+            <a:r>
+              <a:rPr lang="en-US" dirty="0"/>
+              <a:t> Test </a:t>
+            </a:r>
+            <a:r>
+              <a:rPr lang="en-US" dirty="0">
+                <a:sym typeface="Wingdings" panose="05000000000000000000" pitchFamily="2" charset="2"/>
+              </a:rPr>
+              <a:t> </a:t>
+            </a:r>
+            <a:r>
+              <a:rPr lang="en-US" dirty="0"/>
+              <a:t>QA </a:t>
+            </a:r>
+            <a:r>
+              <a:rPr lang="en-US" dirty="0">
+                <a:sym typeface="Wingdings" panose="05000000000000000000" pitchFamily="2" charset="2"/>
+              </a:rPr>
+              <a:t> </a:t>
+            </a:r>
+            <a:r>
+              <a:rPr lang="en-US" dirty="0"/>
+              <a:t>Production </a:t>
+            </a:r>
+            <a:r>
+              <a:rPr lang="en-US" dirty="0">
+                <a:sym typeface="Wingdings" panose="05000000000000000000" pitchFamily="2" charset="2"/>
+              </a:rPr>
+              <a:t> Development</a:t>
+            </a:r>
+          </a:p>
+          <a:p>
+            <a:pPr lvl="1"/>
+            <a:endParaRPr lang="en-US" dirty="0"/>
+          </a:p>
+          <a:p>
+            <a:pPr lvl="1"/>
+            <a:r>
+              <a:rPr lang="en-US" dirty="0"/>
+              <a:t>Allows the ability to easily spin up Multiple instances of Application environments (side by side)</a:t>
+            </a:r>
+          </a:p>
+        </p:txBody>
+      </p:sp>
+      <mc:AlternateContent xmlns:mc="http://schemas.openxmlformats.org/markup-compatibility/2006" xmlns:p14="http://schemas.microsoft.com/office/powerpoint/2010/main">
+        <mc:Choice Requires="p14">
+          <p:contentPart p14:bwMode="auto" r:id="rId2">
+            <p14:nvContentPartPr>
+              <p14:cNvPr id="29" name="Ink 28">
+                <a:extLst>
+                  <a:ext uri="{FF2B5EF4-FFF2-40B4-BE49-F238E27FC236}">
+                    <a16:creationId xmlns:a16="http://schemas.microsoft.com/office/drawing/2014/main" id="{C38CFCE8-FB71-4FA0-897A-5D65E9286E40}"/>
+                  </a:ext>
+                </a:extLst>
+              </p14:cNvPr>
+              <p14:cNvContentPartPr/>
+              <p14:nvPr/>
+            </p14:nvContentPartPr>
+            <p14:xfrm>
+              <a:off x="778447" y="4274365"/>
+              <a:ext cx="8986680" cy="675720"/>
+            </p14:xfrm>
+          </p:contentPart>
+        </mc:Choice>
+        <mc:Fallback xmlns="">
+          <p:pic>
+            <p:nvPicPr>
+              <p:cNvPr id="29" name="Ink 28">
+                <a:extLst>
+                  <a:ext uri="{FF2B5EF4-FFF2-40B4-BE49-F238E27FC236}">
+                    <a16:creationId xmlns:a16="http://schemas.microsoft.com/office/drawing/2014/main" id="{C38CFCE8-FB71-4FA0-897A-5D65E9286E40}"/>
+                  </a:ext>
+                </a:extLst>
+              </p:cNvPr>
+              <p:cNvPicPr/>
+              <p:nvPr/>
+            </p:nvPicPr>
+            <p:blipFill>
+              <a:blip r:embed="rId3"/>
+              <a:stretch>
+                <a:fillRect/>
+              </a:stretch>
+            </p:blipFill>
+            <p:spPr>
+              <a:xfrm>
+                <a:off x="740287" y="4236205"/>
+                <a:ext cx="9062640" cy="751680"/>
+              </a:xfrm>
+              <a:prstGeom prst="rect">
+                <a:avLst/>
+              </a:prstGeom>
+            </p:spPr>
+          </p:pic>
+        </mc:Fallback>
+      </mc:AlternateContent>
+      <mc:AlternateContent xmlns:mc="http://schemas.openxmlformats.org/markup-compatibility/2006" xmlns:p14="http://schemas.microsoft.com/office/powerpoint/2010/main">
+        <mc:Choice Requires="p14">
+          <p:contentPart p14:bwMode="auto" r:id="rId4">
+            <p14:nvContentPartPr>
+              <p14:cNvPr id="31" name="Ink 30">
+                <a:extLst>
+                  <a:ext uri="{FF2B5EF4-FFF2-40B4-BE49-F238E27FC236}">
+                    <a16:creationId xmlns:a16="http://schemas.microsoft.com/office/drawing/2014/main" id="{1DA1C568-BB4C-49C8-B71B-3E91A8D9211B}"/>
+                  </a:ext>
+                </a:extLst>
+              </p14:cNvPr>
+              <p14:cNvContentPartPr/>
+              <p14:nvPr/>
+            </p14:nvContentPartPr>
+            <p14:xfrm>
+              <a:off x="1053487" y="4517725"/>
+              <a:ext cx="398520" cy="93600"/>
+            </p14:xfrm>
+          </p:contentPart>
+        </mc:Choice>
+        <mc:Fallback xmlns="">
+          <p:pic>
+            <p:nvPicPr>
+              <p:cNvPr id="31" name="Ink 30">
+                <a:extLst>
+                  <a:ext uri="{FF2B5EF4-FFF2-40B4-BE49-F238E27FC236}">
+                    <a16:creationId xmlns:a16="http://schemas.microsoft.com/office/drawing/2014/main" id="{1DA1C568-BB4C-49C8-B71B-3E91A8D9211B}"/>
+                  </a:ext>
+                </a:extLst>
+              </p:cNvPr>
+              <p:cNvPicPr/>
+              <p:nvPr/>
+            </p:nvPicPr>
+            <p:blipFill>
+              <a:blip r:embed="rId5"/>
+              <a:stretch>
+                <a:fillRect/>
+              </a:stretch>
+            </p:blipFill>
+            <p:spPr>
+              <a:xfrm>
+                <a:off x="1015327" y="4479418"/>
+                <a:ext cx="474480" cy="169853"/>
+              </a:xfrm>
+              <a:prstGeom prst="rect">
+                <a:avLst/>
+              </a:prstGeom>
+            </p:spPr>
+          </p:pic>
+        </mc:Fallback>
+      </mc:AlternateContent>
+    </p:spTree>
+    <p:extLst>
+      <p:ext uri="{BB962C8B-B14F-4D97-AF65-F5344CB8AC3E}">
+        <p14:creationId xmlns:p14="http://schemas.microsoft.com/office/powerpoint/2010/main" val="4221582426"/>
+      </p:ext>
+    </p:extLst>
+  </p:cSld>
+  <p:clrMapOvr>
+    <a:masterClrMapping/>
+  </p:clrMapOvr>
+  <mc:AlternateContent xmlns:mc="http://schemas.openxmlformats.org/markup-compatibility/2006" xmlns:p14="http://schemas.microsoft.com/office/powerpoint/2010/main">
+    <mc:Choice Requires="p14">
+      <p:transition spd="med" p14:dur="700">
+        <p:fade/>
+      </p:transition>
+    </mc:Choice>
+    <mc:Fallback xmlns="">
+      <p:transition spd="med">
+        <p:fade/>
+      </p:transition>
+    </mc:Fallback>
+  </mc:AlternateContent>
+</p:sld>
+</file>
+
+<file path=ppt/slides/slide4.xml><?xml version="1.0" encoding="utf-8"?>
+<p:sld xmlns:a="http://schemas.openxmlformats.org/drawingml/2006/main" xmlns:r="http://schemas.openxmlformats.org/officeDocument/2006/relationships" xmlns:p="http://schemas.openxmlformats.org/presentationml/2006/main">
+  <p:cSld>
+    <p:spTree>
+      <p:nvGrpSpPr>
+        <p:cNvPr id="1" name=""/>
+        <p:cNvGrpSpPr/>
+        <p:nvPr/>
+      </p:nvGrpSpPr>
+      <p:grpSpPr>
+        <a:xfrm>
+          <a:off x="0" y="0"/>
+          <a:ext cx="0" cy="0"/>
+          <a:chOff x="0" y="0"/>
+          <a:chExt cx="0" cy="0"/>
+        </a:xfrm>
+      </p:grpSpPr>
+      <p:sp>
+        <p:nvSpPr>
+          <p:cNvPr id="2" name="Title 1"/>
+          <p:cNvSpPr>
+            <a:spLocks noGrp="1"/>
+          </p:cNvSpPr>
+          <p:nvPr>
+            <p:ph type="title"/>
+          </p:nvPr>
+        </p:nvSpPr>
+        <p:spPr>
+          <a:xfrm>
+            <a:off x="455612" y="5257800"/>
+            <a:ext cx="10971372" cy="1066800"/>
+          </a:xfrm>
+        </p:spPr>
+        <p:txBody>
+          <a:bodyPr/>
+          <a:lstStyle/>
+          <a:p>
+            <a:r>
+              <a:rPr lang="en-US" dirty="0"/>
+              <a:t>When to use ADF?</a:t>
+            </a:r>
+          </a:p>
+        </p:txBody>
+      </p:sp>
+      <p:sp>
+        <p:nvSpPr>
+          <p:cNvPr id="3" name="Content Placeholder 2"/>
+          <p:cNvSpPr>
+            <a:spLocks noGrp="1"/>
+          </p:cNvSpPr>
+          <p:nvPr>
+            <p:ph sz="half" idx="1"/>
+          </p:nvPr>
+        </p:nvSpPr>
+        <p:spPr>
+          <a:xfrm>
+            <a:off x="609440" y="685800"/>
+            <a:ext cx="6246971" cy="4876800"/>
+          </a:xfrm>
+        </p:spPr>
+        <p:txBody>
+          <a:bodyPr>
+            <a:normAutofit/>
+          </a:bodyPr>
+          <a:lstStyle/>
+          <a:p>
+            <a:r>
+              <a:rPr lang="en-US" dirty="0"/>
+              <a:t>To walk through the layers of Azure </a:t>
+            </a:r>
+            <a:r>
+              <a:rPr lang="en-US" b="1" dirty="0"/>
+              <a:t>and</a:t>
+            </a:r>
+            <a:r>
+              <a:rPr lang="en-US" dirty="0"/>
+              <a:t> understand the customer application step by step.</a:t>
+            </a:r>
+          </a:p>
+          <a:p>
+            <a:r>
+              <a:rPr lang="en-US" dirty="0"/>
+              <a:t>Document requirements as you go.</a:t>
+            </a:r>
+          </a:p>
+          <a:p>
+            <a:r>
+              <a:rPr lang="en-US" dirty="0"/>
+              <a:t>Ideal for lift and shift, with focus on full Automation (not imaging).</a:t>
+            </a:r>
+          </a:p>
+          <a:p>
+            <a:r>
+              <a:rPr lang="en-US" dirty="0"/>
+              <a:t>Best suited to Application migrations (not full datacenter migrations).</a:t>
+            </a:r>
+          </a:p>
+          <a:p>
+            <a:r>
+              <a:rPr lang="en-US" dirty="0"/>
+              <a:t>Easier to implement for Developers, over Operators? (</a:t>
+            </a:r>
+            <a:r>
+              <a:rPr lang="en-US" dirty="0" err="1"/>
+              <a:t>IaC</a:t>
+            </a:r>
+            <a:r>
+              <a:rPr lang="en-US" dirty="0"/>
+              <a:t>).</a:t>
+            </a:r>
+          </a:p>
+        </p:txBody>
+      </p:sp>
+      <p:graphicFrame>
+        <p:nvGraphicFramePr>
+          <p:cNvPr id="5" name="Content Placeholder 4" descr="Basic venn diagram showing overlapping relationships between 4 tasks"/>
+          <p:cNvGraphicFramePr>
+            <a:graphicFrameLocks noGrp="1"/>
+          </p:cNvGraphicFramePr>
+          <p:nvPr>
+            <p:ph sz="half" idx="2"/>
+            <p:extLst>
+              <p:ext uri="{D42A27DB-BD31-4B8C-83A1-F6EECF244321}">
+                <p14:modId xmlns:p14="http://schemas.microsoft.com/office/powerpoint/2010/main" val="4246510064"/>
+              </p:ext>
+            </p:extLst>
+          </p:nvPr>
+        </p:nvGraphicFramePr>
+        <p:xfrm>
+          <a:off x="6551613" y="685800"/>
+          <a:ext cx="5029200" cy="4191000"/>
+        </p:xfrm>
+        <a:graphic>
+          <a:graphicData uri="http://schemas.openxmlformats.org/drawingml/2006/diagram">
+            <dgm:relIds xmlns:dgm="http://schemas.openxmlformats.org/drawingml/2006/diagram" xmlns:r="http://schemas.openxmlformats.org/officeDocument/2006/relationships" r:dm="rId2" r:lo="rId3" r:qs="rId4" r:cs="rId5"/>
+          </a:graphicData>
+        </a:graphic>
+      </p:graphicFrame>
+    </p:spTree>
+    <p:extLst>
+      <p:ext uri="{BB962C8B-B14F-4D97-AF65-F5344CB8AC3E}">
+        <p14:creationId xmlns:p14="http://schemas.microsoft.com/office/powerpoint/2010/main" val="3098616160"/>
+      </p:ext>
+    </p:extLst>
+  </p:cSld>
+  <p:clrMapOvr>
+    <a:masterClrMapping/>
+  </p:clrMapOvr>
+  <mc:AlternateContent xmlns:mc="http://schemas.openxmlformats.org/markup-compatibility/2006" xmlns:p14="http://schemas.microsoft.com/office/powerpoint/2010/main">
+    <mc:Choice Requires="p14">
+      <p:transition spd="med" p14:dur="700">
+        <p:fade/>
+      </p:transition>
+    </mc:Choice>
+    <mc:Fallback xmlns="">
+      <p:transition spd="med">
+        <p:fade/>
+      </p:transition>
+    </mc:Fallback>
+  </mc:AlternateContent>
+</p:sld>
+</file>
+
+<file path=ppt/slides/slide5.xml><?xml version="1.0" encoding="utf-8"?>
+<p:sld xmlns:a="http://schemas.openxmlformats.org/drawingml/2006/main" xmlns:r="http://schemas.openxmlformats.org/officeDocument/2006/relationships" xmlns:p="http://schemas.openxmlformats.org/presentationml/2006/main">
+  <p:cSld>
+    <p:spTree>
+      <p:nvGrpSpPr>
+        <p:cNvPr id="1" name=""/>
+        <p:cNvGrpSpPr/>
+        <p:nvPr/>
+      </p:nvGrpSpPr>
+      <p:grpSpPr>
+        <a:xfrm>
+          <a:off x="0" y="0"/>
+          <a:ext cx="0" cy="0"/>
+          <a:chOff x="0" y="0"/>
+          <a:chExt cx="0" cy="0"/>
+        </a:xfrm>
+      </p:grpSpPr>
+      <p:sp>
+        <p:nvSpPr>
+          <p:cNvPr id="2" name="Title 1"/>
+          <p:cNvSpPr>
+            <a:spLocks noGrp="1"/>
+          </p:cNvSpPr>
+          <p:nvPr>
+            <p:ph type="title"/>
+          </p:nvPr>
+        </p:nvSpPr>
+        <p:spPr>
+          <a:xfrm>
+            <a:off x="455612" y="5605462"/>
+            <a:ext cx="11430000" cy="1066800"/>
+          </a:xfrm>
+        </p:spPr>
+        <p:txBody>
+          <a:bodyPr/>
+          <a:lstStyle/>
+          <a:p>
+            <a:r>
+              <a:rPr lang="en-US" dirty="0"/>
+              <a:t>How to get started? (Understand what ADF can do)</a:t>
+            </a:r>
+          </a:p>
+        </p:txBody>
+      </p:sp>
+      <p:pic>
+        <p:nvPicPr>
+          <p:cNvPr id="5" name="Picture 4">
+            <a:extLst>
+              <a:ext uri="{FF2B5EF4-FFF2-40B4-BE49-F238E27FC236}">
+                <a16:creationId xmlns:a16="http://schemas.microsoft.com/office/drawing/2014/main" id="{B9713008-544C-4C7A-AF7F-4122086B1E37}"/>
+              </a:ext>
+            </a:extLst>
+          </p:cNvPr>
+          <p:cNvPicPr>
+            <a:picLocks noChangeAspect="1"/>
+          </p:cNvPicPr>
+          <p:nvPr/>
+        </p:nvPicPr>
+        <p:blipFill>
+          <a:blip r:embed="rId2"/>
+          <a:stretch>
+            <a:fillRect/>
+          </a:stretch>
+        </p:blipFill>
+        <p:spPr>
+          <a:xfrm>
+            <a:off x="2055812" y="42862"/>
+            <a:ext cx="7716709" cy="6096000"/>
+          </a:xfrm>
+          <a:prstGeom prst="rect">
+            <a:avLst/>
+          </a:prstGeom>
+        </p:spPr>
+      </p:pic>
+    </p:spTree>
+    <p:extLst>
+      <p:ext uri="{BB962C8B-B14F-4D97-AF65-F5344CB8AC3E}">
+        <p14:creationId xmlns:p14="http://schemas.microsoft.com/office/powerpoint/2010/main" val="3846006634"/>
+      </p:ext>
+    </p:extLst>
+  </p:cSld>
+  <p:clrMapOvr>
+    <a:masterClrMapping/>
+  </p:clrMapOvr>
+  <mc:AlternateContent xmlns:mc="http://schemas.openxmlformats.org/markup-compatibility/2006" xmlns:p14="http://schemas.microsoft.com/office/powerpoint/2010/main">
+    <mc:Choice Requires="p14">
+      <p:transition spd="med" p14:dur="700">
+        <p:fade/>
+      </p:transition>
+    </mc:Choice>
+    <mc:Fallback xmlns="">
+      <p:transition spd="med">
+        <p:fade/>
+      </p:transition>
+    </mc:Fallback>
+  </mc:AlternateContent>
+</p:sld>
+</file>
+
+<file path=ppt/slides/slide6.xml><?xml version="1.0" encoding="utf-8"?>
+<p:sld xmlns:a="http://schemas.openxmlformats.org/drawingml/2006/main" xmlns:r="http://schemas.openxmlformats.org/officeDocument/2006/relationships" xmlns:p="http://schemas.openxmlformats.org/presentationml/2006/main">
+  <p:cSld>
+    <p:spTree>
+      <p:nvGrpSpPr>
+        <p:cNvPr id="1" name=""/>
+        <p:cNvGrpSpPr/>
+        <p:nvPr/>
+      </p:nvGrpSpPr>
+      <p:grpSpPr>
+        <a:xfrm>
+          <a:off x="0" y="0"/>
+          <a:ext cx="0" cy="0"/>
+          <a:chOff x="0" y="0"/>
+          <a:chExt cx="0" cy="0"/>
+        </a:xfrm>
+      </p:grpSpPr>
+      <p:sp>
+        <p:nvSpPr>
+          <p:cNvPr id="2" name="Title 1">
+            <a:extLst>
+              <a:ext uri="{FF2B5EF4-FFF2-40B4-BE49-F238E27FC236}">
+                <a16:creationId xmlns:a16="http://schemas.microsoft.com/office/drawing/2014/main" id="{E1C26EFF-7BFF-47B2-8B7A-869327F508DB}"/>
+              </a:ext>
+            </a:extLst>
+          </p:cNvPr>
+          <p:cNvSpPr>
+            <a:spLocks noGrp="1"/>
+          </p:cNvSpPr>
+          <p:nvPr>
+            <p:ph type="title"/>
+          </p:nvPr>
+        </p:nvSpPr>
+        <p:spPr>
+          <a:xfrm>
+            <a:off x="609441" y="6019800"/>
+            <a:ext cx="10971372" cy="609600"/>
+          </a:xfrm>
+        </p:spPr>
+        <p:txBody>
+          <a:bodyPr/>
+          <a:lstStyle/>
+          <a:p>
+            <a:r>
+              <a:rPr lang="en-US" dirty="0"/>
+              <a:t>How to get started? (Which files to look at)</a:t>
+            </a:r>
+          </a:p>
+        </p:txBody>
+      </p:sp>
+      <p:pic>
+        <p:nvPicPr>
+          <p:cNvPr id="5" name="Content Placeholder 4">
+            <a:extLst>
+              <a:ext uri="{FF2B5EF4-FFF2-40B4-BE49-F238E27FC236}">
+                <a16:creationId xmlns:a16="http://schemas.microsoft.com/office/drawing/2014/main" id="{DB5C6F0A-5881-43F3-8B4E-F9B9CEE3BF9A}"/>
+              </a:ext>
+            </a:extLst>
+          </p:cNvPr>
+          <p:cNvPicPr>
+            <a:picLocks noGrp="1" noChangeAspect="1"/>
+          </p:cNvPicPr>
+          <p:nvPr>
+            <p:ph idx="13"/>
+          </p:nvPr>
+        </p:nvPicPr>
+        <p:blipFill>
+          <a:blip r:embed="rId2"/>
+          <a:stretch>
+            <a:fillRect/>
+          </a:stretch>
+        </p:blipFill>
+        <p:spPr>
+          <a:xfrm>
+            <a:off x="760412" y="228600"/>
+            <a:ext cx="10572368" cy="5844062"/>
+          </a:xfrm>
+        </p:spPr>
+      </p:pic>
+    </p:spTree>
+    <p:extLst>
+      <p:ext uri="{BB962C8B-B14F-4D97-AF65-F5344CB8AC3E}">
+        <p14:creationId xmlns:p14="http://schemas.microsoft.com/office/powerpoint/2010/main" val="1271740416"/>
+      </p:ext>
+    </p:extLst>
+  </p:cSld>
+  <p:clrMapOvr>
+    <a:masterClrMapping/>
+  </p:clrMapOvr>
+  <mc:AlternateContent xmlns:mc="http://schemas.openxmlformats.org/markup-compatibility/2006" xmlns:p14="http://schemas.microsoft.com/office/powerpoint/2010/main">
+    <mc:Choice Requires="p14">
+      <p:transition spd="med" p14:dur="700">
+        <p:fade/>
+      </p:transition>
+    </mc:Choice>
+    <mc:Fallback xmlns="">
+      <p:transition spd="med">
+        <p:fade/>
+      </p:transition>
+    </mc:Fallback>
+  </mc:AlternateContent>
+</p:sld>
+</file>
+
+<file path=ppt/slides/slide7.xml><?xml version="1.0" encoding="utf-8"?>
+<p:sld xmlns:a="http://schemas.openxmlformats.org/drawingml/2006/main" xmlns:r="http://schemas.openxmlformats.org/officeDocument/2006/relationships" xmlns:p="http://schemas.openxmlformats.org/presentationml/2006/main">
+  <p:cSld>
+    <p:spTree>
+      <p:nvGrpSpPr>
+        <p:cNvPr id="1" name=""/>
+        <p:cNvGrpSpPr/>
+        <p:nvPr/>
+      </p:nvGrpSpPr>
+      <p:grpSpPr>
+        <a:xfrm>
+          <a:off x="0" y="0"/>
+          <a:ext cx="0" cy="0"/>
+          <a:chOff x="0" y="0"/>
+          <a:chExt cx="0" cy="0"/>
+        </a:xfrm>
+      </p:grpSpPr>
+      <p:sp>
+        <p:nvSpPr>
+          <p:cNvPr id="2" name="Title 1"/>
+          <p:cNvSpPr>
+            <a:spLocks noGrp="1"/>
+          </p:cNvSpPr>
+          <p:nvPr>
+            <p:ph type="title"/>
+          </p:nvPr>
+        </p:nvSpPr>
+        <p:spPr>
+          <a:xfrm>
+            <a:off x="455612" y="5257800"/>
+            <a:ext cx="10971372" cy="1066800"/>
+          </a:xfrm>
+        </p:spPr>
+        <p:txBody>
+          <a:bodyPr/>
+          <a:lstStyle/>
+          <a:p>
+            <a:r>
+              <a:rPr lang="en-US" dirty="0"/>
+              <a:t>How to get started?</a:t>
+            </a:r>
+          </a:p>
+        </p:txBody>
+      </p:sp>
+      <p:sp>
+        <p:nvSpPr>
+          <p:cNvPr id="3" name="Content Placeholder 2"/>
+          <p:cNvSpPr>
+            <a:spLocks noGrp="1"/>
+          </p:cNvSpPr>
+          <p:nvPr>
+            <p:ph sz="half" idx="1"/>
+          </p:nvPr>
+        </p:nvSpPr>
+        <p:spPr>
+          <a:xfrm>
+            <a:off x="609440" y="685800"/>
+            <a:ext cx="9828372" cy="5029200"/>
+          </a:xfrm>
+        </p:spPr>
+        <p:txBody>
+          <a:bodyPr>
+            <a:normAutofit fontScale="92500" lnSpcReduction="20000"/>
+          </a:bodyPr>
+          <a:lstStyle/>
+          <a:p>
+            <a:pPr marL="514350" indent="-514350">
+              <a:buFont typeface="+mj-lt"/>
+              <a:buAutoNum type="arabicPeriod"/>
+            </a:pPr>
+            <a:r>
+              <a:rPr lang="en-US" dirty="0"/>
+              <a:t>Become familiar with the tools and processes used in ADF</a:t>
+            </a:r>
+          </a:p>
+          <a:p>
+            <a:pPr lvl="1"/>
+            <a:r>
+              <a:rPr lang="en-US" dirty="0"/>
+              <a:t>Start deploying straight away</a:t>
+            </a:r>
+          </a:p>
+          <a:p>
+            <a:pPr lvl="1"/>
+            <a:r>
+              <a:rPr lang="en-US" dirty="0"/>
+              <a:t>Start to work on the DSC configurations for the Application</a:t>
+            </a:r>
+          </a:p>
+          <a:p>
+            <a:pPr marL="514350" indent="-514350">
+              <a:buFont typeface="+mj-lt"/>
+              <a:buAutoNum type="arabicPeriod"/>
+            </a:pPr>
+            <a:r>
+              <a:rPr lang="en-US" dirty="0"/>
+              <a:t>Discuss Azure capabilities and build the configurations</a:t>
+            </a:r>
+          </a:p>
+          <a:p>
+            <a:pPr lvl="1"/>
+            <a:r>
+              <a:rPr lang="en-US" dirty="0"/>
+              <a:t>Log Analytics</a:t>
+            </a:r>
+          </a:p>
+          <a:p>
+            <a:pPr lvl="1"/>
+            <a:r>
+              <a:rPr lang="en-US" dirty="0"/>
+              <a:t>Virtual Networks</a:t>
+            </a:r>
+          </a:p>
+          <a:p>
+            <a:pPr lvl="2"/>
+            <a:r>
+              <a:rPr lang="en-US" dirty="0"/>
+              <a:t>Topology</a:t>
+            </a:r>
+          </a:p>
+          <a:p>
+            <a:pPr lvl="2"/>
+            <a:r>
+              <a:rPr lang="en-US" dirty="0"/>
+              <a:t>Subnet sizes</a:t>
+            </a:r>
+          </a:p>
+          <a:p>
+            <a:pPr lvl="2"/>
+            <a:r>
+              <a:rPr lang="en-US" dirty="0"/>
+              <a:t>NSG’s</a:t>
+            </a:r>
+          </a:p>
+          <a:p>
+            <a:pPr lvl="1"/>
+            <a:r>
+              <a:rPr lang="en-US" dirty="0"/>
+              <a:t>Load Balancers</a:t>
+            </a:r>
+          </a:p>
+          <a:p>
+            <a:pPr lvl="1"/>
+            <a:r>
+              <a:rPr lang="en-US" dirty="0"/>
+              <a:t>Virtual Machines</a:t>
+            </a:r>
+          </a:p>
+          <a:p>
+            <a:pPr lvl="2"/>
+            <a:r>
+              <a:rPr lang="en-US" dirty="0"/>
+              <a:t>Linux</a:t>
+            </a:r>
+          </a:p>
+          <a:p>
+            <a:pPr lvl="2"/>
+            <a:r>
+              <a:rPr lang="en-US" dirty="0"/>
+              <a:t>Windows</a:t>
+            </a:r>
+          </a:p>
+          <a:p>
+            <a:pPr lvl="2"/>
+            <a:r>
+              <a:rPr lang="en-US" dirty="0"/>
+              <a:t>Appliances</a:t>
+            </a:r>
+          </a:p>
+          <a:p>
+            <a:pPr lvl="1"/>
+            <a:r>
+              <a:rPr lang="en-US" dirty="0"/>
+              <a:t>Web Application Firewalls</a:t>
+            </a:r>
+          </a:p>
+        </p:txBody>
+      </p:sp>
+    </p:spTree>
+    <p:extLst>
+      <p:ext uri="{BB962C8B-B14F-4D97-AF65-F5344CB8AC3E}">
+        <p14:creationId xmlns:p14="http://schemas.microsoft.com/office/powerpoint/2010/main" val="1292389478"/>
+      </p:ext>
+    </p:extLst>
+  </p:cSld>
+  <p:clrMapOvr>
+    <a:masterClrMapping/>
+  </p:clrMapOvr>
+  <mc:AlternateContent xmlns:mc="http://schemas.openxmlformats.org/markup-compatibility/2006" xmlns:p14="http://schemas.microsoft.com/office/powerpoint/2010/main">
+    <mc:Choice Requires="p14">
+      <p:transition spd="med" p14:dur="700">
+        <p:fade/>
+      </p:transition>
+    </mc:Choice>
+    <mc:Fallback xmlns="">
+      <p:transition spd="med">
+        <p:fade/>
+      </p:transition>
+    </mc:Fallback>
+  </mc:AlternateContent>
+</p:sld>
+</file>
+
+<file path=ppt/slides/slide8.xml><?xml version="1.0" encoding="utf-8"?>
+<p:sld xmlns:a="http://schemas.openxmlformats.org/drawingml/2006/main" xmlns:r="http://schemas.openxmlformats.org/officeDocument/2006/relationships" xmlns:p="http://schemas.openxmlformats.org/presentationml/2006/main">
+  <p:cSld>
+    <p:spTree>
+      <p:nvGrpSpPr>
+        <p:cNvPr id="1" name=""/>
+        <p:cNvGrpSpPr/>
+        <p:nvPr/>
+      </p:nvGrpSpPr>
+      <p:grpSpPr>
+        <a:xfrm>
+          <a:off x="0" y="0"/>
+          <a:ext cx="0" cy="0"/>
+          <a:chOff x="0" y="0"/>
+          <a:chExt cx="0" cy="0"/>
+        </a:xfrm>
+      </p:grpSpPr>
+      <p:sp>
+        <p:nvSpPr>
+          <p:cNvPr id="2" name="Title 1"/>
+          <p:cNvSpPr>
+            <a:spLocks noGrp="1"/>
+          </p:cNvSpPr>
+          <p:nvPr>
+            <p:ph type="title"/>
+          </p:nvPr>
+        </p:nvSpPr>
+        <p:spPr>
+          <a:xfrm>
+            <a:off x="609440" y="5249248"/>
+            <a:ext cx="10971372" cy="1066800"/>
+          </a:xfrm>
+        </p:spPr>
+        <p:txBody>
+          <a:bodyPr/>
+          <a:lstStyle/>
+          <a:p>
+            <a:r>
+              <a:rPr lang="en-US" dirty="0"/>
+              <a:t>How to get started? (start deploying with ARM)</a:t>
+            </a:r>
+          </a:p>
+        </p:txBody>
+      </p:sp>
+      <p:pic>
+        <p:nvPicPr>
+          <p:cNvPr id="8" name="Picture 7">
+            <a:extLst>
+              <a:ext uri="{FF2B5EF4-FFF2-40B4-BE49-F238E27FC236}">
+                <a16:creationId xmlns:a16="http://schemas.microsoft.com/office/drawing/2014/main" id="{93A4D04C-E03E-4585-B4BB-67FAD1D2ACBC}"/>
+              </a:ext>
+            </a:extLst>
+          </p:cNvPr>
+          <p:cNvPicPr>
+            <a:picLocks noChangeAspect="1"/>
+          </p:cNvPicPr>
+          <p:nvPr/>
+        </p:nvPicPr>
+        <p:blipFill>
+          <a:blip r:embed="rId2"/>
+          <a:stretch>
+            <a:fillRect/>
+          </a:stretch>
+        </p:blipFill>
+        <p:spPr>
+          <a:xfrm>
+            <a:off x="1141412" y="533400"/>
+            <a:ext cx="9448800" cy="4841975"/>
+          </a:xfrm>
+          <a:prstGeom prst="rect">
+            <a:avLst/>
+          </a:prstGeom>
+        </p:spPr>
+      </p:pic>
+      <p:pic>
+        <p:nvPicPr>
+          <p:cNvPr id="9" name="Picture 8">
+            <a:extLst>
+              <a:ext uri="{FF2B5EF4-FFF2-40B4-BE49-F238E27FC236}">
+                <a16:creationId xmlns:a16="http://schemas.microsoft.com/office/drawing/2014/main" id="{ED828013-3ED4-4DCD-B6C9-CF64990C5BD2}"/>
+              </a:ext>
+            </a:extLst>
+          </p:cNvPr>
+          <p:cNvPicPr>
+            <a:picLocks noChangeAspect="1"/>
+          </p:cNvPicPr>
+          <p:nvPr/>
+        </p:nvPicPr>
+        <p:blipFill>
+          <a:blip r:embed="rId3"/>
+          <a:stretch>
+            <a:fillRect/>
+          </a:stretch>
+        </p:blipFill>
+        <p:spPr>
+          <a:xfrm>
+            <a:off x="2350565" y="412523"/>
+            <a:ext cx="6715648" cy="5083728"/>
+          </a:xfrm>
+          <a:prstGeom prst="rect">
+            <a:avLst/>
+          </a:prstGeom>
+        </p:spPr>
+      </p:pic>
+      <p:pic>
+        <p:nvPicPr>
+          <p:cNvPr id="11" name="Picture 10">
+            <a:extLst>
+              <a:ext uri="{FF2B5EF4-FFF2-40B4-BE49-F238E27FC236}">
+                <a16:creationId xmlns:a16="http://schemas.microsoft.com/office/drawing/2014/main" id="{B3A1658E-1020-4B6D-AC9E-F034AC7CBAD9}"/>
+              </a:ext>
+            </a:extLst>
+          </p:cNvPr>
+          <p:cNvPicPr>
+            <a:picLocks noChangeAspect="1"/>
+          </p:cNvPicPr>
+          <p:nvPr/>
+        </p:nvPicPr>
+        <p:blipFill>
+          <a:blip r:embed="rId4"/>
+          <a:stretch>
+            <a:fillRect/>
+          </a:stretch>
+        </p:blipFill>
+        <p:spPr>
+          <a:xfrm>
+            <a:off x="2174121" y="562294"/>
+            <a:ext cx="7068536" cy="4686954"/>
+          </a:xfrm>
+          <a:prstGeom prst="rect">
+            <a:avLst/>
+          </a:prstGeom>
+        </p:spPr>
+      </p:pic>
+      <p:pic>
+        <p:nvPicPr>
+          <p:cNvPr id="12" name="Picture 11">
+            <a:extLst>
+              <a:ext uri="{FF2B5EF4-FFF2-40B4-BE49-F238E27FC236}">
+                <a16:creationId xmlns:a16="http://schemas.microsoft.com/office/drawing/2014/main" id="{F1EB9362-29E7-411D-AAD3-D3005AAD10C9}"/>
+              </a:ext>
+            </a:extLst>
+          </p:cNvPr>
+          <p:cNvPicPr>
+            <a:picLocks noChangeAspect="1"/>
+          </p:cNvPicPr>
+          <p:nvPr/>
+        </p:nvPicPr>
+        <p:blipFill>
+          <a:blip r:embed="rId5"/>
+          <a:stretch>
+            <a:fillRect/>
+          </a:stretch>
+        </p:blipFill>
+        <p:spPr>
+          <a:xfrm>
+            <a:off x="2489411" y="815694"/>
+            <a:ext cx="7211431" cy="4467849"/>
+          </a:xfrm>
+          <a:prstGeom prst="rect">
+            <a:avLst/>
+          </a:prstGeom>
+        </p:spPr>
+      </p:pic>
+      <p:pic>
+        <p:nvPicPr>
+          <p:cNvPr id="13" name="Picture 12">
+            <a:extLst>
+              <a:ext uri="{FF2B5EF4-FFF2-40B4-BE49-F238E27FC236}">
+                <a16:creationId xmlns:a16="http://schemas.microsoft.com/office/drawing/2014/main" id="{2878409D-B478-4D7D-92CA-07299B041236}"/>
+              </a:ext>
+            </a:extLst>
+          </p:cNvPr>
+          <p:cNvPicPr>
+            <a:picLocks noChangeAspect="1"/>
+          </p:cNvPicPr>
+          <p:nvPr/>
+        </p:nvPicPr>
+        <p:blipFill>
+          <a:blip r:embed="rId6"/>
+          <a:stretch>
+            <a:fillRect/>
+          </a:stretch>
+        </p:blipFill>
+        <p:spPr>
+          <a:xfrm>
+            <a:off x="3430516" y="829031"/>
+            <a:ext cx="4972744" cy="4153480"/>
+          </a:xfrm>
+          <a:prstGeom prst="rect">
+            <a:avLst/>
+          </a:prstGeom>
+        </p:spPr>
+      </p:pic>
+    </p:spTree>
+    <p:extLst>
+      <p:ext uri="{BB962C8B-B14F-4D97-AF65-F5344CB8AC3E}">
+        <p14:creationId xmlns:p14="http://schemas.microsoft.com/office/powerpoint/2010/main" val="381540845"/>
+      </p:ext>
+    </p:extLst>
+  </p:cSld>
+  <p:clrMapOvr>
+    <a:masterClrMapping/>
+  </p:clrMapOvr>
+  <mc:AlternateContent xmlns:mc="http://schemas.openxmlformats.org/markup-compatibility/2006" xmlns:p14="http://schemas.microsoft.com/office/powerpoint/2010/main">
+    <mc:Choice Requires="p14">
+      <p:transition spd="med" p14:dur="700">
+        <p:fade/>
+      </p:transition>
+    </mc:Choice>
+    <mc:Fallback xmlns="">
+      <p:transition spd="med">
+        <p:fade/>
+      </p:transition>
+    </mc:Fallback>
+  </mc:AlternateContent>
+  <p:timing>
+    <p:tnLst>
+      <p:par>
+        <p:cTn id="1" dur="indefinite" restart="never" nodeType="tmRoot">
+          <p:childTnLst>
+            <p:seq concurrent="1" nextAc="seek">
+              <p:cTn id="2" dur="indefinite" nodeType="mainSeq">
+                <p:childTnLst>
+                  <p:par>
+                    <p:cTn id="3" fill="hold">
+                      <p:stCondLst>
+                        <p:cond delay="indefinite"/>
+                      </p:stCondLst>
+                      <p:childTnLst>
+                        <p:par>
+                          <p:cTn id="4" fill="hold">
+                            <p:stCondLst>
+                              <p:cond delay="0"/>
+                            </p:stCondLst>
+                            <p:childTnLst>
+                              <p:par>
+                                <p:cTn id="5" presetID="1" presetClass="entr" presetSubtype="0" fill="hold" nodeType="clickEffect">
+                                  <p:stCondLst>
+                                    <p:cond delay="0"/>
+                                  </p:stCondLst>
+                                  <p:childTnLst>
+                                    <p:set>
+                                      <p:cBhvr>
+                                        <p:cTn id="6" dur="1" fill="hold">
+                                          <p:stCondLst>
+                                            <p:cond delay="0"/>
+                                          </p:stCondLst>
+                                        </p:cTn>
+                                        <p:tgtEl>
+                                          <p:spTgt spid="8"/>
+                                        </p:tgtEl>
+                                        <p:attrNameLst>
+                                          <p:attrName>style.visibility</p:attrName>
+                                        </p:attrNameLst>
+                                      </p:cBhvr>
+                                      <p:to>
+                                        <p:strVal val="visible"/>
+                                      </p:to>
+                                    </p:set>
+                                  </p:childTnLst>
+                                </p:cTn>
+                              </p:par>
+                            </p:childTnLst>
+                          </p:cTn>
+                        </p:par>
+                      </p:childTnLst>
+                    </p:cTn>
+                  </p:par>
+                  <p:par>
+                    <p:cTn id="7" fill="hold">
+                      <p:stCondLst>
+                        <p:cond delay="indefinite"/>
+                      </p:stCondLst>
+                      <p:childTnLst>
+                        <p:par>
+                          <p:cTn id="8" fill="hold">
+                            <p:stCondLst>
+                              <p:cond delay="0"/>
+                            </p:stCondLst>
+                            <p:childTnLst>
+                              <p:par>
+                                <p:cTn id="9" presetID="1" presetClass="exit" presetSubtype="0" fill="hold" nodeType="clickEffect">
+                                  <p:stCondLst>
+                                    <p:cond delay="0"/>
+                                  </p:stCondLst>
+                                  <p:childTnLst>
+                                    <p:set>
+                                      <p:cBhvr>
+                                        <p:cTn id="10" dur="1" fill="hold">
+                                          <p:stCondLst>
+                                            <p:cond delay="0"/>
+                                          </p:stCondLst>
+                                        </p:cTn>
+                                        <p:tgtEl>
+                                          <p:spTgt spid="8"/>
+                                        </p:tgtEl>
+                                        <p:attrNameLst>
+                                          <p:attrName>style.visibility</p:attrName>
+                                        </p:attrNameLst>
+                                      </p:cBhvr>
+                                      <p:to>
+                                        <p:strVal val="hidden"/>
+                                      </p:to>
+                                    </p:set>
+                                  </p:childTnLst>
+                                </p:cTn>
+                              </p:par>
+                            </p:childTnLst>
+                          </p:cTn>
+                        </p:par>
+                      </p:childTnLst>
+                    </p:cTn>
+                  </p:par>
+                  <p:par>
+                    <p:cTn id="11" fill="hold">
+                      <p:stCondLst>
+                        <p:cond delay="indefinite"/>
+                      </p:stCondLst>
+                      <p:childTnLst>
+                        <p:par>
+                          <p:cTn id="12" fill="hold">
+                            <p:stCondLst>
+                              <p:cond delay="0"/>
+                            </p:stCondLst>
+                            <p:childTnLst>
+                              <p:par>
+                                <p:cTn id="13" presetID="1" presetClass="entr" presetSubtype="0" fill="hold" nodeType="clickEffect">
+                                  <p:stCondLst>
+                                    <p:cond delay="0"/>
+                                  </p:stCondLst>
+                                  <p:childTnLst>
+                                    <p:set>
+                                      <p:cBhvr>
+                                        <p:cTn id="14" dur="1" fill="hold">
+                                          <p:stCondLst>
+                                            <p:cond delay="0"/>
+                                          </p:stCondLst>
+                                        </p:cTn>
+                                        <p:tgtEl>
+                                          <p:spTgt spid="9"/>
+                                        </p:tgtEl>
+                                        <p:attrNameLst>
+                                          <p:attrName>style.visibility</p:attrName>
+                                        </p:attrNameLst>
+                                      </p:cBhvr>
+                                      <p:to>
+                                        <p:strVal val="visible"/>
+                                      </p:to>
+                                    </p:set>
+                                  </p:childTnLst>
+                                </p:cTn>
+                              </p:par>
+                            </p:childTnLst>
+                          </p:cTn>
+                        </p:par>
+                      </p:childTnLst>
+                    </p:cTn>
+                  </p:par>
+                  <p:par>
+                    <p:cTn id="15" fill="hold">
+                      <p:stCondLst>
+                        <p:cond delay="indefinite"/>
+                      </p:stCondLst>
+                      <p:childTnLst>
+                        <p:par>
+                          <p:cTn id="16" fill="hold">
+                            <p:stCondLst>
+                              <p:cond delay="0"/>
+                            </p:stCondLst>
+                            <p:childTnLst>
+                              <p:par>
+                                <p:cTn id="17" presetID="1" presetClass="exit" presetSubtype="0" fill="hold" nodeType="clickEffect">
+                                  <p:stCondLst>
+                                    <p:cond delay="0"/>
+                                  </p:stCondLst>
+                                  <p:childTnLst>
+                                    <p:set>
+                                      <p:cBhvr>
+                                        <p:cTn id="18" dur="1" fill="hold">
+                                          <p:stCondLst>
+                                            <p:cond delay="0"/>
+                                          </p:stCondLst>
+                                        </p:cTn>
+                                        <p:tgtEl>
+                                          <p:spTgt spid="9"/>
+                                        </p:tgtEl>
+                                        <p:attrNameLst>
+                                          <p:attrName>style.visibility</p:attrName>
+                                        </p:attrNameLst>
+                                      </p:cBhvr>
+                                      <p:to>
+                                        <p:strVal val="hidden"/>
+                                      </p:to>
+                                    </p:set>
+                                  </p:childTnLst>
+                                </p:cTn>
+                              </p:par>
+                            </p:childTnLst>
+                          </p:cTn>
+                        </p:par>
+                      </p:childTnLst>
+                    </p:cTn>
+                  </p:par>
+                  <p:par>
+                    <p:cTn id="19" fill="hold">
+                      <p:stCondLst>
+                        <p:cond delay="indefinite"/>
+                      </p:stCondLst>
+                      <p:childTnLst>
+                        <p:par>
+                          <p:cTn id="20" fill="hold">
+                            <p:stCondLst>
+                              <p:cond delay="0"/>
+                            </p:stCondLst>
+                            <p:childTnLst>
+                              <p:par>
+                                <p:cTn id="21" presetID="1" presetClass="entr" presetSubtype="0" fill="hold" nodeType="clickEffect">
+                                  <p:stCondLst>
+                                    <p:cond delay="0"/>
+                                  </p:stCondLst>
+                                  <p:childTnLst>
+                                    <p:set>
+                                      <p:cBhvr>
+                                        <p:cTn id="22" dur="1" fill="hold">
+                                          <p:stCondLst>
+                                            <p:cond delay="0"/>
+                                          </p:stCondLst>
+                                        </p:cTn>
+                                        <p:tgtEl>
+                                          <p:spTgt spid="11"/>
+                                        </p:tgtEl>
+                                        <p:attrNameLst>
+                                          <p:attrName>style.visibility</p:attrName>
+                                        </p:attrNameLst>
+                                      </p:cBhvr>
+                                      <p:to>
+                                        <p:strVal val="visible"/>
+                                      </p:to>
+                                    </p:set>
+                                  </p:childTnLst>
+                                </p:cTn>
+                              </p:par>
+                            </p:childTnLst>
+                          </p:cTn>
+                        </p:par>
+                      </p:childTnLst>
+                    </p:cTn>
+                  </p:par>
+                  <p:par>
+                    <p:cTn id="23" fill="hold">
+                      <p:stCondLst>
+                        <p:cond delay="indefinite"/>
+                      </p:stCondLst>
+                      <p:childTnLst>
+                        <p:par>
+                          <p:cTn id="24" fill="hold">
+                            <p:stCondLst>
+                              <p:cond delay="0"/>
+                            </p:stCondLst>
+                            <p:childTnLst>
+                              <p:par>
+                                <p:cTn id="25" presetID="1" presetClass="exit" presetSubtype="0" fill="hold" nodeType="clickEffect">
+                                  <p:stCondLst>
+                                    <p:cond delay="0"/>
+                                  </p:stCondLst>
+                                  <p:childTnLst>
+                                    <p:set>
+                                      <p:cBhvr>
+                                        <p:cTn id="26" dur="1" fill="hold">
+                                          <p:stCondLst>
+                                            <p:cond delay="0"/>
+                                          </p:stCondLst>
+                                        </p:cTn>
+                                        <p:tgtEl>
+                                          <p:spTgt spid="11"/>
+                                        </p:tgtEl>
+                                        <p:attrNameLst>
+                                          <p:attrName>style.visibility</p:attrName>
+                                        </p:attrNameLst>
+                                      </p:cBhvr>
+                                      <p:to>
+                                        <p:strVal val="hidden"/>
+                                      </p:to>
+                                    </p:set>
+                                  </p:childTnLst>
+                                </p:cTn>
+                              </p:par>
+                            </p:childTnLst>
+                          </p:cTn>
+                        </p:par>
+                      </p:childTnLst>
+                    </p:cTn>
+                  </p:par>
+                  <p:par>
+                    <p:cTn id="27" fill="hold">
+                      <p:stCondLst>
+                        <p:cond delay="indefinite"/>
+                      </p:stCondLst>
+                      <p:childTnLst>
+                        <p:par>
+                          <p:cTn id="28" fill="hold">
+                            <p:stCondLst>
+                              <p:cond delay="0"/>
+                            </p:stCondLst>
+                            <p:childTnLst>
+                              <p:par>
+                                <p:cTn id="29" presetID="1" presetClass="entr" presetSubtype="0" fill="hold" nodeType="clickEffect">
+                                  <p:stCondLst>
+                                    <p:cond delay="0"/>
+                                  </p:stCondLst>
+                                  <p:childTnLst>
+                                    <p:set>
+                                      <p:cBhvr>
+                                        <p:cTn id="30" dur="1" fill="hold">
+                                          <p:stCondLst>
+                                            <p:cond delay="0"/>
+                                          </p:stCondLst>
+                                        </p:cTn>
+                                        <p:tgtEl>
+                                          <p:spTgt spid="12"/>
+                                        </p:tgtEl>
+                                        <p:attrNameLst>
+                                          <p:attrName>style.visibility</p:attrName>
+                                        </p:attrNameLst>
+                                      </p:cBhvr>
+                                      <p:to>
+                                        <p:strVal val="visible"/>
+                                      </p:to>
+                                    </p:set>
+                                  </p:childTnLst>
+                                </p:cTn>
+                              </p:par>
+                            </p:childTnLst>
+                          </p:cTn>
+                        </p:par>
+                      </p:childTnLst>
+                    </p:cTn>
+                  </p:par>
+                  <p:par>
+                    <p:cTn id="31" fill="hold">
+                      <p:stCondLst>
+                        <p:cond delay="indefinite"/>
+                      </p:stCondLst>
+                      <p:childTnLst>
+                        <p:par>
+                          <p:cTn id="32" fill="hold">
+                            <p:stCondLst>
+                              <p:cond delay="0"/>
+                            </p:stCondLst>
+                            <p:childTnLst>
+                              <p:par>
+                                <p:cTn id="33" presetID="1" presetClass="exit" presetSubtype="0" fill="hold" nodeType="clickEffect">
+                                  <p:stCondLst>
+                                    <p:cond delay="0"/>
+                                  </p:stCondLst>
+                                  <p:childTnLst>
+                                    <p:set>
+                                      <p:cBhvr>
+                                        <p:cTn id="34" dur="1" fill="hold">
+                                          <p:stCondLst>
+                                            <p:cond delay="0"/>
+                                          </p:stCondLst>
+                                        </p:cTn>
+                                        <p:tgtEl>
+                                          <p:spTgt spid="12"/>
+                                        </p:tgtEl>
+                                        <p:attrNameLst>
+                                          <p:attrName>style.visibility</p:attrName>
+                                        </p:attrNameLst>
+                                      </p:cBhvr>
+                                      <p:to>
+                                        <p:strVal val="hidden"/>
+                                      </p:to>
+                                    </p:set>
+                                  </p:childTnLst>
+                                </p:cTn>
+                              </p:par>
+                            </p:childTnLst>
+                          </p:cTn>
+                        </p:par>
+                      </p:childTnLst>
+                    </p:cTn>
+                  </p:par>
+                  <p:par>
+                    <p:cTn id="35" fill="hold">
+                      <p:stCondLst>
+                        <p:cond delay="indefinite"/>
+                      </p:stCondLst>
+                      <p:childTnLst>
+                        <p:par>
+                          <p:cTn id="36" fill="hold">
+                            <p:stCondLst>
+                              <p:cond delay="0"/>
+                            </p:stCondLst>
+                            <p:childTnLst>
+                              <p:par>
+                                <p:cTn id="37" presetID="1" presetClass="entr" presetSubtype="0" fill="hold" nodeType="clickEffect">
+                                  <p:stCondLst>
+                                    <p:cond delay="0"/>
+                                  </p:stCondLst>
+                                  <p:childTnLst>
+                                    <p:set>
+                                      <p:cBhvr>
+                                        <p:cTn id="38" dur="1" fill="hold">
+                                          <p:stCondLst>
+                                            <p:cond delay="0"/>
+                                          </p:stCondLst>
+                                        </p:cTn>
+                                        <p:tgtEl>
+                                          <p:spTgt spid="13"/>
+                                        </p:tgtEl>
+                                        <p:attrNameLst>
+                                          <p:attrName>style.visibility</p:attrName>
+                                        </p:attrNameLst>
+                                      </p:cBhvr>
+                                      <p:to>
+                                        <p:strVal val="visible"/>
+                                      </p:to>
+                                    </p:set>
+                                  </p:childTnLst>
+                                </p:cTn>
+                              </p:par>
+                            </p:childTnLst>
+                          </p:cTn>
+                        </p:par>
+                      </p:childTnLst>
+                    </p:cTn>
+                  </p:par>
+                </p:childTnLst>
+              </p:cTn>
+              <p:prevCondLst>
+                <p:cond evt="onPrev" delay="0">
+                  <p:tgtEl>
+                    <p:sldTgt/>
+                  </p:tgtEl>
+                </p:cond>
+              </p:prevCondLst>
+              <p:nextCondLst>
+                <p:cond evt="onNext" delay="0">
+                  <p:tgtEl>
+                    <p:sldTgt/>
+                  </p:tgtEl>
+                </p:cond>
+              </p:nextCondLst>
+            </p:seq>
+          </p:childTnLst>
+        </p:cTn>
+      </p:par>
+    </p:tnLst>
+  </p:timing>
+</p:sld>
+</file>
+
+<file path=ppt/slides/slide9.xml><?xml version="1.0" encoding="utf-8"?>
+<p:sld xmlns:a="http://schemas.openxmlformats.org/drawingml/2006/main" xmlns:r="http://schemas.openxmlformats.org/officeDocument/2006/relationships" xmlns:p="http://schemas.openxmlformats.org/presentationml/2006/main">
+  <p:cSld>
+    <p:spTree>
+      <p:nvGrpSpPr>
+        <p:cNvPr id="1" name=""/>
+        <p:cNvGrpSpPr/>
+        <p:nvPr/>
+      </p:nvGrpSpPr>
+      <p:grpSpPr>
+        <a:xfrm>
+          <a:off x="0" y="0"/>
+          <a:ext cx="0" cy="0"/>
+          <a:chOff x="0" y="0"/>
+          <a:chExt cx="0" cy="0"/>
+        </a:xfrm>
+      </p:grpSpPr>
+      <p:sp>
+        <p:nvSpPr>
+          <p:cNvPr id="2" name="Title 1"/>
+          <p:cNvSpPr>
+            <a:spLocks noGrp="1"/>
+          </p:cNvSpPr>
+          <p:nvPr>
+            <p:ph type="title"/>
+          </p:nvPr>
+        </p:nvSpPr>
+        <p:spPr>
+          <a:xfrm>
+            <a:off x="608012" y="5257800"/>
+            <a:ext cx="11430000" cy="1066800"/>
+          </a:xfrm>
+        </p:spPr>
+        <p:txBody>
+          <a:bodyPr/>
+          <a:lstStyle/>
+          <a:p>
+            <a:r>
+              <a:rPr lang="en-US" dirty="0"/>
+              <a:t>How to get started? (Become familiar with DSC)</a:t>
+            </a:r>
+          </a:p>
+        </p:txBody>
+      </p:sp>
+      <p:pic>
+        <p:nvPicPr>
+          <p:cNvPr id="7" name="Picture 6">
+            <a:extLst>
+              <a:ext uri="{FF2B5EF4-FFF2-40B4-BE49-F238E27FC236}">
+                <a16:creationId xmlns:a16="http://schemas.microsoft.com/office/drawing/2014/main" id="{82A14CD9-CCE0-4645-ACCD-D3A74874AF7B}"/>
+              </a:ext>
+            </a:extLst>
+          </p:cNvPr>
+          <p:cNvPicPr>
+            <a:picLocks noChangeAspect="1"/>
+          </p:cNvPicPr>
+          <p:nvPr/>
+        </p:nvPicPr>
+        <p:blipFill>
+          <a:blip r:embed="rId2"/>
+          <a:stretch>
+            <a:fillRect/>
+          </a:stretch>
+        </p:blipFill>
+        <p:spPr>
+          <a:xfrm>
+            <a:off x="655638" y="685800"/>
+            <a:ext cx="11000886" cy="4724400"/>
+          </a:xfrm>
+          <a:prstGeom prst="rect">
+            <a:avLst/>
+          </a:prstGeom>
+        </p:spPr>
+      </p:pic>
+    </p:spTree>
+    <p:extLst>
+      <p:ext uri="{BB962C8B-B14F-4D97-AF65-F5344CB8AC3E}">
+        <p14:creationId xmlns:p14="http://schemas.microsoft.com/office/powerpoint/2010/main" val="3997117863"/>
+      </p:ext>
+    </p:extLst>
+  </p:cSld>
+  <p:clrMapOvr>
+    <a:masterClrMapping/>
+  </p:clrMapOvr>
+  <mc:AlternateContent xmlns:mc="http://schemas.openxmlformats.org/markup-compatibility/2006" xmlns:p14="http://schemas.microsoft.com/office/powerpoint/2010/main">
+    <mc:Choice Requires="p14">
+      <p:transition spd="med" p14:dur="700">
+        <p:fade/>
+      </p:transition>
+    </mc:Choice>
+    <mc:Fallback xmlns="">
+      <p:transition spd="med">
+        <p:fade/>
+      </p:transition>
+    </mc:Fallback>
+  </mc:AlternateContent>
 </p:sld>
 </file>
 
@@ -11991,6 +12096,12 @@
 </file>
 
 <file path=customXml/item2.xml><?xml version="1.0" encoding="utf-8"?>
+<p:properties xmlns:p="http://schemas.microsoft.com/office/2006/metadata/properties" xmlns:xsi="http://www.w3.org/2001/XMLSchema-instance" xmlns:pc="http://schemas.microsoft.com/office/infopath/2007/PartnerControls">
+  <documentManagement/>
+</p:properties>
+</file>
+
+<file path=customXml/item3.xml><?xml version="1.0" encoding="utf-8"?>
 <ct:contentTypeSchema xmlns:ct="http://schemas.microsoft.com/office/2006/metadata/contentType" xmlns:ma="http://schemas.microsoft.com/office/2006/metadata/properties/metaAttributes" ct:_="" ma:_="" ma:contentTypeName="Document" ma:contentTypeID="0x0101004D445A1F0B47A64E8BCB7F600EB772BE" ma:contentTypeVersion="2" ma:contentTypeDescription="Create a new document." ma:contentTypeScope="" ma:versionID="d45b806cb6717f9c292127fec61080d1">
   <xsd:schema xmlns:xsd="http://www.w3.org/2001/XMLSchema" xmlns:xs="http://www.w3.org/2001/XMLSchema" xmlns:p="http://schemas.microsoft.com/office/2006/metadata/properties" xmlns:ns2="3fbeeacb-7a52-4089-9938-2baadc6e1226" targetNamespace="http://schemas.microsoft.com/office/2006/metadata/properties" ma:root="true" ma:fieldsID="09f29b915fa1014edca7bb21cb8975a3" ns2:_="">
     <xsd:import namespace="3fbeeacb-7a52-4089-9938-2baadc6e1226"/>
@@ -12122,12 +12233,6 @@
 </ct:contentTypeSchema>
 </file>
 
-<file path=customXml/item3.xml><?xml version="1.0" encoding="utf-8"?>
-<p:properties xmlns:p="http://schemas.microsoft.com/office/2006/metadata/properties" xmlns:xsi="http://www.w3.org/2001/XMLSchema-instance" xmlns:pc="http://schemas.microsoft.com/office/infopath/2007/PartnerControls">
-  <documentManagement/>
-</p:properties>
-</file>
-
 <file path=customXml/itemProps1.xml><?xml version="1.0" encoding="utf-8"?>
 <ds:datastoreItem xmlns:ds="http://schemas.openxmlformats.org/officeDocument/2006/customXml" ds:itemID="{DB431559-67A3-4293-AAD5-3767E9311634}">
   <ds:schemaRefs>
@@ -12137,6 +12242,15 @@
 </file>
 
 <file path=customXml/itemProps2.xml><?xml version="1.0" encoding="utf-8"?>
+<ds:datastoreItem xmlns:ds="http://schemas.openxmlformats.org/officeDocument/2006/customXml" ds:itemID="{592DF1AA-AD5C-4728-BA5D-8706F2B29210}">
+  <ds:schemaRefs>
+    <ds:schemaRef ds:uri="http://schemas.microsoft.com/office/2006/metadata/properties"/>
+    <ds:schemaRef ds:uri="http://schemas.microsoft.com/office/infopath/2007/PartnerControls"/>
+  </ds:schemaRefs>
+</ds:datastoreItem>
+</file>
+
+<file path=customXml/itemProps3.xml><?xml version="1.0" encoding="utf-8"?>
 <ds:datastoreItem xmlns:ds="http://schemas.openxmlformats.org/officeDocument/2006/customXml" ds:itemID="{E3F500FE-BC19-49E1-9212-06F8B305C0E8}">
   <ds:schemaRefs>
     <ds:schemaRef ds:uri="http://schemas.microsoft.com/office/2006/metadata/contentType"/>
@@ -12152,13 +12266,4 @@
     <ds:schemaRef ds:uri="http://schemas.microsoft.com/internal/obd"/>
   </ds:schemaRefs>
 </ds:datastoreItem>
-</file>
-
-<file path=customXml/itemProps3.xml><?xml version="1.0" encoding="utf-8"?>
-<ds:datastoreItem xmlns:ds="http://schemas.openxmlformats.org/officeDocument/2006/customXml" ds:itemID="{592DF1AA-AD5C-4728-BA5D-8706F2B29210}">
-  <ds:schemaRefs>
-    <ds:schemaRef ds:uri="http://schemas.microsoft.com/office/2006/metadata/properties"/>
-    <ds:schemaRef ds:uri="http://schemas.microsoft.com/office/infopath/2007/PartnerControls"/>
-  </ds:schemaRefs>
-</ds:datastoreItem>
 </file>
</xml_diff>

<commit_message>
start getting started docs
</commit_message>
<xml_diff>
--- a/docs/ADF.pptx
+++ b/docs/ADF.pptx
@@ -5,23 +5,24 @@
     <p:sldMasterId id="2147483660" r:id="rId4"/>
   </p:sldMasterIdLst>
   <p:notesMasterIdLst>
-    <p:notesMasterId r:id="rId16"/>
+    <p:notesMasterId r:id="rId17"/>
   </p:notesMasterIdLst>
   <p:handoutMasterIdLst>
-    <p:handoutMasterId r:id="rId17"/>
+    <p:handoutMasterId r:id="rId18"/>
   </p:handoutMasterIdLst>
   <p:sldIdLst>
     <p:sldId id="256" r:id="rId5"/>
     <p:sldId id="257" r:id="rId6"/>
     <p:sldId id="258" r:id="rId7"/>
     <p:sldId id="259" r:id="rId8"/>
-    <p:sldId id="268" r:id="rId9"/>
-    <p:sldId id="271" r:id="rId10"/>
-    <p:sldId id="267" r:id="rId11"/>
-    <p:sldId id="260" r:id="rId12"/>
-    <p:sldId id="265" r:id="rId13"/>
-    <p:sldId id="269" r:id="rId14"/>
-    <p:sldId id="270" r:id="rId15"/>
+    <p:sldId id="272" r:id="rId9"/>
+    <p:sldId id="268" r:id="rId10"/>
+    <p:sldId id="271" r:id="rId11"/>
+    <p:sldId id="267" r:id="rId12"/>
+    <p:sldId id="260" r:id="rId13"/>
+    <p:sldId id="265" r:id="rId14"/>
+    <p:sldId id="269" r:id="rId15"/>
+    <p:sldId id="270" r:id="rId16"/>
   </p:sldIdLst>
   <p:sldSz cx="12188825" cy="6858000"/>
   <p:notesSz cx="6858000" cy="9144000"/>
@@ -3957,7 +3958,7 @@
           <a:p>
             <a:fld id="{AC8CEC3D-96F7-401F-9673-3EE7F75C9C5B}" type="datetimeFigureOut">
               <a:rPr lang="en-US"/>
-              <a:t>12/10/2020</a:t>
+              <a:t>1/17/2021</a:t>
             </a:fld>
             <a:endParaRPr dirty="0"/>
           </a:p>
@@ -4176,7 +4177,7 @@
           <a:p>
             <a:fld id="{F032BCF4-D26D-4DAF-9F57-FE1E61FE7935}" type="datetimeFigureOut">
               <a:rPr lang="en-US"/>
-              <a:t>12/10/2020</a:t>
+              <a:t>1/17/2021</a:t>
             </a:fld>
             <a:endParaRPr dirty="0"/>
           </a:p>
@@ -4919,7 +4920,7 @@
           <a:p>
             <a:fld id="{DAD2365B-5397-4552-89D2-3C31D6B894C4}" type="datetime1">
               <a:rPr lang="en-US" smtClean="0"/>
-              <a:t>12/10/2020</a:t>
+              <a:t>1/17/2021</a:t>
             </a:fld>
             <a:endParaRPr lang="en-US" dirty="0"/>
           </a:p>
@@ -5148,7 +5149,7 @@
           <a:p>
             <a:fld id="{3718D474-84CF-40A5-B032-DFFDE135438A}" type="datetime1">
               <a:rPr lang="en-US" smtClean="0"/>
-              <a:t>12/10/2020</a:t>
+              <a:t>1/17/2021</a:t>
             </a:fld>
             <a:endParaRPr lang="en-US" dirty="0"/>
           </a:p>
@@ -5370,7 +5371,7 @@
           <a:p>
             <a:fld id="{7067C6EF-6B90-465F-AC36-47BDECADBD65}" type="datetime1">
               <a:rPr lang="en-US" smtClean="0"/>
-              <a:t>12/10/2020</a:t>
+              <a:t>1/17/2021</a:t>
             </a:fld>
             <a:endParaRPr lang="en-US" dirty="0"/>
           </a:p>
@@ -5587,7 +5588,7 @@
           <a:p>
             <a:fld id="{ED1E4A86-2703-4937-ABF7-D8FBDB5C3D3E}" type="datetime1">
               <a:rPr lang="en-US" smtClean="0"/>
-              <a:t>12/10/2020</a:t>
+              <a:t>1/17/2021</a:t>
             </a:fld>
             <a:endParaRPr lang="en-US" dirty="0"/>
           </a:p>
@@ -5853,7 +5854,7 @@
           <a:p>
             <a:fld id="{12E02F23-BD92-4B7B-9DFF-42EEC8F21ED4}" type="datetime1">
               <a:rPr lang="en-US" smtClean="0"/>
-              <a:t>12/10/2020</a:t>
+              <a:t>1/17/2021</a:t>
             </a:fld>
             <a:endParaRPr lang="en-US" dirty="0"/>
           </a:p>
@@ -6155,7 +6156,7 @@
           <a:p>
             <a:fld id="{8814B7EA-8738-442B-ADC7-3A7E6F5C49CD}" type="datetime1">
               <a:rPr lang="en-US" smtClean="0"/>
-              <a:t>12/10/2020</a:t>
+              <a:t>1/17/2021</a:t>
             </a:fld>
             <a:endParaRPr lang="en-US" dirty="0"/>
           </a:p>
@@ -6605,7 +6606,7 @@
           <a:p>
             <a:fld id="{8FE5692D-78A6-499F-901A-E660774CC8EE}" type="datetime1">
               <a:rPr lang="en-US" smtClean="0"/>
-              <a:t>12/10/2020</a:t>
+              <a:t>1/17/2021</a:t>
             </a:fld>
             <a:endParaRPr lang="en-US" dirty="0"/>
           </a:p>
@@ -6738,7 +6739,7 @@
           <a:p>
             <a:fld id="{6776F355-F21B-43C0-ABBD-B5AEBBE279A6}" type="datetime1">
               <a:rPr lang="en-US" smtClean="0"/>
-              <a:t>12/10/2020</a:t>
+              <a:t>1/17/2021</a:t>
             </a:fld>
             <a:endParaRPr lang="en-US" dirty="0"/>
           </a:p>
@@ -6848,7 +6849,7 @@
           <a:p>
             <a:fld id="{C0AB95E7-F437-40FB-91EE-0B08B57CB523}" type="datetime1">
               <a:rPr lang="en-US" smtClean="0"/>
-              <a:t>12/10/2020</a:t>
+              <a:t>1/17/2021</a:t>
             </a:fld>
             <a:endParaRPr lang="en-US" dirty="0"/>
           </a:p>
@@ -7148,7 +7149,7 @@
           <a:p>
             <a:fld id="{67709EEF-87D9-4049-9A5D-A2B5E4C83A85}" type="datetime1">
               <a:rPr lang="en-US" smtClean="0"/>
-              <a:t>12/10/2020</a:t>
+              <a:t>1/17/2021</a:t>
             </a:fld>
             <a:endParaRPr lang="en-US" dirty="0"/>
           </a:p>
@@ -7437,7 +7438,7 @@
           <a:p>
             <a:fld id="{CAEBD992-82F2-4752-BCD7-4BDCCFA26099}" type="datetime1">
               <a:rPr lang="en-US" smtClean="0"/>
-              <a:t>12/10/2020</a:t>
+              <a:t>1/17/2021</a:t>
             </a:fld>
             <a:endParaRPr lang="en-US" dirty="0"/>
           </a:p>
@@ -7735,7 +7736,7 @@
             <a:fld id="{7590C4DA-EDE6-465C-B91D-0B6D7078AFBA}" type="datetime1">
               <a:rPr lang="en-US" smtClean="0"/>
               <a:pPr/>
-              <a:t>12/10/2020</a:t>
+              <a:t>1/17/2021</a:t>
             </a:fld>
             <a:endParaRPr lang="en-US" dirty="0"/>
           </a:p>
@@ -8315,6 +8316,105 @@
 </file>
 
 <file path=ppt/slides/slide10.xml><?xml version="1.0" encoding="utf-8"?>
+<p:sld xmlns:a="http://schemas.openxmlformats.org/drawingml/2006/main" xmlns:r="http://schemas.openxmlformats.org/officeDocument/2006/relationships" xmlns:p="http://schemas.openxmlformats.org/presentationml/2006/main">
+  <p:cSld>
+    <p:spTree>
+      <p:nvGrpSpPr>
+        <p:cNvPr id="1" name=""/>
+        <p:cNvGrpSpPr/>
+        <p:nvPr/>
+      </p:nvGrpSpPr>
+      <p:grpSpPr>
+        <a:xfrm>
+          <a:off x="0" y="0"/>
+          <a:ext cx="0" cy="0"/>
+          <a:chOff x="0" y="0"/>
+          <a:chExt cx="0" cy="0"/>
+        </a:xfrm>
+      </p:grpSpPr>
+      <p:sp>
+        <p:nvSpPr>
+          <p:cNvPr id="2" name="Title 1"/>
+          <p:cNvSpPr>
+            <a:spLocks noGrp="1"/>
+          </p:cNvSpPr>
+          <p:nvPr>
+            <p:ph type="title"/>
+          </p:nvPr>
+        </p:nvSpPr>
+        <p:spPr>
+          <a:xfrm>
+            <a:off x="608012" y="5257800"/>
+            <a:ext cx="11430000" cy="1066800"/>
+          </a:xfrm>
+        </p:spPr>
+        <p:txBody>
+          <a:bodyPr/>
+          <a:lstStyle/>
+          <a:p>
+            <a:r>
+              <a:rPr lang="en-US" dirty="0"/>
+              <a:t>How to get started? (Become familiar with DSC)</a:t>
+            </a:r>
+          </a:p>
+        </p:txBody>
+      </p:sp>
+      <p:pic>
+        <p:nvPicPr>
+          <p:cNvPr id="7" name="Picture 6">
+            <a:extLst>
+              <a:ext uri="{FF2B5EF4-FFF2-40B4-BE49-F238E27FC236}">
+                <a16:creationId xmlns:a16="http://schemas.microsoft.com/office/drawing/2014/main" id="{82A14CD9-CCE0-4645-ACCD-D3A74874AF7B}"/>
+              </a:ext>
+            </a:extLst>
+          </p:cNvPr>
+          <p:cNvPicPr>
+            <a:picLocks noChangeAspect="1"/>
+          </p:cNvPicPr>
+          <p:nvPr/>
+        </p:nvPicPr>
+        <p:blipFill>
+          <a:blip r:embed="rId2"/>
+          <a:stretch>
+            <a:fillRect/>
+          </a:stretch>
+        </p:blipFill>
+        <p:spPr>
+          <a:xfrm>
+            <a:off x="655638" y="685800"/>
+            <a:ext cx="11000886" cy="4724400"/>
+          </a:xfrm>
+          <a:prstGeom prst="rect">
+            <a:avLst/>
+          </a:prstGeom>
+        </p:spPr>
+      </p:pic>
+    </p:spTree>
+    <p:extLst>
+      <p:ext uri="{BB962C8B-B14F-4D97-AF65-F5344CB8AC3E}">
+        <p14:creationId xmlns:p14="http://schemas.microsoft.com/office/powerpoint/2010/main" val="3997117863"/>
+      </p:ext>
+    </p:extLst>
+  </p:cSld>
+  <p:clrMapOvr>
+    <a:masterClrMapping/>
+  </p:clrMapOvr>
+  <mc:AlternateContent xmlns:mc="http://schemas.openxmlformats.org/markup-compatibility/2006" xmlns:p14="http://schemas.microsoft.com/office/powerpoint/2010/main">
+    <mc:Choice Requires="p14">
+      <p:transition spd="med" p14:dur="700">
+        <p:fade/>
+      </p:transition>
+    </mc:Choice>
+    <mc:Fallback xmlns="">
+      <p:transition spd="med">
+        <p:fade/>
+      </p:transition>
+    </mc:Fallback>
+  </mc:AlternateContent>
+</p:sld>
+</file>
+
+<file path=ppt/slides/slide11.xml><?xml version="1.0" encoding="utf-8"?>
 <p:sld xmlns:a="http://schemas.openxmlformats.org/drawingml/2006/main" xmlns:r="http://schemas.openxmlformats.org/officeDocument/2006/relationships" xmlns:p="http://schemas.openxmlformats.org/presentationml/2006/main">
   <p:cSld>
     <p:spTree>
@@ -9087,7 +9187,7 @@
 </p:sld>
 </file>
 
-<file path=ppt/slides/slide11.xml><?xml version="1.0" encoding="utf-8"?>
+<file path=ppt/slides/slide12.xml><?xml version="1.0" encoding="utf-8"?>
 <p:sld xmlns:a="http://schemas.openxmlformats.org/drawingml/2006/main" xmlns:r="http://schemas.openxmlformats.org/officeDocument/2006/relationships" xmlns:p="http://schemas.openxmlformats.org/presentationml/2006/main">
   <p:cSld>
     <p:spTree>
@@ -10075,6 +10175,163 @@
       </p:grpSpPr>
       <p:sp>
         <p:nvSpPr>
+          <p:cNvPr id="2" name="Title 1">
+            <a:extLst>
+              <a:ext uri="{FF2B5EF4-FFF2-40B4-BE49-F238E27FC236}">
+                <a16:creationId xmlns:a16="http://schemas.microsoft.com/office/drawing/2014/main" id="{77C91D0E-03E1-4401-AE1B-B4E048486369}"/>
+              </a:ext>
+            </a:extLst>
+          </p:cNvPr>
+          <p:cNvSpPr>
+            <a:spLocks noGrp="1"/>
+          </p:cNvSpPr>
+          <p:nvPr>
+            <p:ph type="title"/>
+          </p:nvPr>
+        </p:nvSpPr>
+        <p:spPr/>
+        <p:txBody>
+          <a:bodyPr/>
+          <a:lstStyle/>
+          <a:p>
+            <a:endParaRPr lang="en-US"/>
+          </a:p>
+        </p:txBody>
+      </p:sp>
+      <p:sp>
+        <p:nvSpPr>
+          <p:cNvPr id="6" name="Title 1">
+            <a:extLst>
+              <a:ext uri="{FF2B5EF4-FFF2-40B4-BE49-F238E27FC236}">
+                <a16:creationId xmlns:a16="http://schemas.microsoft.com/office/drawing/2014/main" id="{4C3A83EA-63CF-436B-A9D1-868828F8FC00}"/>
+              </a:ext>
+            </a:extLst>
+          </p:cNvPr>
+          <p:cNvSpPr txBox="1">
+            <a:spLocks/>
+          </p:cNvSpPr>
+          <p:nvPr/>
+        </p:nvSpPr>
+        <p:spPr>
+          <a:xfrm>
+            <a:off x="455612" y="5605462"/>
+            <a:ext cx="11430000" cy="1066800"/>
+          </a:xfrm>
+          <a:prstGeom prst="rect">
+            <a:avLst/>
+          </a:prstGeom>
+        </p:spPr>
+        <p:txBody>
+          <a:bodyPr vert="horz" lIns="91440" tIns="45720" rIns="91440" bIns="45720" rtlCol="0" anchor="b">
+            <a:normAutofit/>
+          </a:bodyPr>
+          <a:lstStyle>
+            <a:lvl1pPr algn="l" defTabSz="914400" rtl="0" eaLnBrk="1" latinLnBrk="0" hangingPunct="1">
+              <a:lnSpc>
+                <a:spcPct val="80000"/>
+              </a:lnSpc>
+              <a:spcBef>
+                <a:spcPct val="0"/>
+              </a:spcBef>
+              <a:buNone/>
+              <a:defRPr sz="3600" kern="1200">
+                <a:solidFill>
+                  <a:schemeClr val="tx2"/>
+                </a:solidFill>
+                <a:latin typeface="+mj-lt"/>
+                <a:ea typeface="+mj-ea"/>
+                <a:cs typeface="+mj-cs"/>
+              </a:defRPr>
+            </a:lvl1pPr>
+          </a:lstStyle>
+          <a:p>
+            <a:r>
+              <a:rPr lang="en-US"/>
+              <a:t>How to get started? (Understand what ADF can do)</a:t>
+            </a:r>
+            <a:endParaRPr lang="en-US" dirty="0"/>
+          </a:p>
+        </p:txBody>
+      </p:sp>
+      <p:pic>
+        <p:nvPicPr>
+          <p:cNvPr id="10" name="Content Placeholder 9" descr="Diagram&#10;&#10;Description automatically generated">
+            <a:extLst>
+              <a:ext uri="{FF2B5EF4-FFF2-40B4-BE49-F238E27FC236}">
+                <a16:creationId xmlns:a16="http://schemas.microsoft.com/office/drawing/2014/main" id="{E4EDC9B8-6F23-412A-98A3-50B1420C0BD2}"/>
+              </a:ext>
+            </a:extLst>
+          </p:cNvPr>
+          <p:cNvPicPr>
+            <a:picLocks noGrp="1" noChangeAspect="1"/>
+          </p:cNvPicPr>
+          <p:nvPr>
+            <p:ph idx="13"/>
+          </p:nvPr>
+        </p:nvPicPr>
+        <p:blipFill>
+          <a:blip r:embed="rId2">
+            <a:extLst>
+              <a:ext uri="{28A0092B-C50C-407E-A947-70E740481C1C}">
+                <a14:useLocalDpi xmlns:a14="http://schemas.microsoft.com/office/drawing/2010/main" val="0"/>
+              </a:ext>
+            </a:extLst>
+          </a:blip>
+          <a:stretch>
+            <a:fillRect/>
+          </a:stretch>
+        </p:blipFill>
+        <p:spPr>
+          <a:xfrm>
+            <a:off x="608012" y="323912"/>
+            <a:ext cx="10515600" cy="5697664"/>
+          </a:xfrm>
+        </p:spPr>
+      </p:pic>
+    </p:spTree>
+    <p:extLst>
+      <p:ext uri="{BB962C8B-B14F-4D97-AF65-F5344CB8AC3E}">
+        <p14:creationId xmlns:p14="http://schemas.microsoft.com/office/powerpoint/2010/main" val="1955298527"/>
+      </p:ext>
+    </p:extLst>
+  </p:cSld>
+  <p:clrMapOvr>
+    <a:masterClrMapping/>
+  </p:clrMapOvr>
+  <mc:AlternateContent xmlns:mc="http://schemas.openxmlformats.org/markup-compatibility/2006" xmlns:p14="http://schemas.microsoft.com/office/powerpoint/2010/main">
+    <mc:Choice Requires="p14">
+      <p:transition spd="med" p14:dur="700">
+        <p:fade/>
+      </p:transition>
+    </mc:Choice>
+    <mc:Fallback xmlns="">
+      <p:transition spd="med">
+        <p:fade/>
+      </p:transition>
+    </mc:Fallback>
+  </mc:AlternateContent>
+</p:sld>
+</file>
+
+<file path=ppt/slides/slide6.xml><?xml version="1.0" encoding="utf-8"?>
+<p:sld xmlns:a="http://schemas.openxmlformats.org/drawingml/2006/main" xmlns:r="http://schemas.openxmlformats.org/officeDocument/2006/relationships" xmlns:p="http://schemas.openxmlformats.org/presentationml/2006/main">
+  <p:cSld>
+    <p:spTree>
+      <p:nvGrpSpPr>
+        <p:cNvPr id="1" name=""/>
+        <p:cNvGrpSpPr/>
+        <p:nvPr/>
+      </p:nvGrpSpPr>
+      <p:grpSpPr>
+        <a:xfrm>
+          <a:off x="0" y="0"/>
+          <a:ext cx="0" cy="0"/>
+          <a:chOff x="0" y="0"/>
+          <a:chExt cx="0" cy="0"/>
+        </a:xfrm>
+      </p:grpSpPr>
+      <p:sp>
+        <p:nvSpPr>
           <p:cNvPr id="2" name="Title 1"/>
           <p:cNvSpPr>
             <a:spLocks noGrp="1"/>
@@ -10155,7 +10412,7 @@
 </p:sld>
 </file>
 
-<file path=ppt/slides/slide6.xml><?xml version="1.0" encoding="utf-8"?>
+<file path=ppt/slides/slide7.xml><?xml version="1.0" encoding="utf-8"?>
 <p:sld xmlns:a="http://schemas.openxmlformats.org/drawingml/2006/main" xmlns:r="http://schemas.openxmlformats.org/officeDocument/2006/relationships" xmlns:p="http://schemas.openxmlformats.org/presentationml/2006/main">
   <p:cSld>
     <p:spTree>
@@ -10259,7 +10516,7 @@
 </p:sld>
 </file>
 
-<file path=ppt/slides/slide7.xml><?xml version="1.0" encoding="utf-8"?>
+<file path=ppt/slides/slide8.xml><?xml version="1.0" encoding="utf-8"?>
 <p:sld xmlns:a="http://schemas.openxmlformats.org/drawingml/2006/main" xmlns:r="http://schemas.openxmlformats.org/officeDocument/2006/relationships" xmlns:p="http://schemas.openxmlformats.org/presentationml/2006/main">
   <p:cSld>
     <p:spTree>
@@ -10462,7 +10719,7 @@
 </p:sld>
 </file>
 
-<file path=ppt/slides/slide8.xml><?xml version="1.0" encoding="utf-8"?>
+<file path=ppt/slides/slide9.xml><?xml version="1.0" encoding="utf-8"?>
 <p:sld xmlns:a="http://schemas.openxmlformats.org/drawingml/2006/main" xmlns:r="http://schemas.openxmlformats.org/officeDocument/2006/relationships" xmlns:p="http://schemas.openxmlformats.org/presentationml/2006/main">
   <p:cSld>
     <p:spTree>
@@ -11113,105 +11370,6 @@
       </p:par>
     </p:tnLst>
   </p:timing>
-</p:sld>
-</file>
-
-<file path=ppt/slides/slide9.xml><?xml version="1.0" encoding="utf-8"?>
-<p:sld xmlns:a="http://schemas.openxmlformats.org/drawingml/2006/main" xmlns:r="http://schemas.openxmlformats.org/officeDocument/2006/relationships" xmlns:p="http://schemas.openxmlformats.org/presentationml/2006/main">
-  <p:cSld>
-    <p:spTree>
-      <p:nvGrpSpPr>
-        <p:cNvPr id="1" name=""/>
-        <p:cNvGrpSpPr/>
-        <p:nvPr/>
-      </p:nvGrpSpPr>
-      <p:grpSpPr>
-        <a:xfrm>
-          <a:off x="0" y="0"/>
-          <a:ext cx="0" cy="0"/>
-          <a:chOff x="0" y="0"/>
-          <a:chExt cx="0" cy="0"/>
-        </a:xfrm>
-      </p:grpSpPr>
-      <p:sp>
-        <p:nvSpPr>
-          <p:cNvPr id="2" name="Title 1"/>
-          <p:cNvSpPr>
-            <a:spLocks noGrp="1"/>
-          </p:cNvSpPr>
-          <p:nvPr>
-            <p:ph type="title"/>
-          </p:nvPr>
-        </p:nvSpPr>
-        <p:spPr>
-          <a:xfrm>
-            <a:off x="608012" y="5257800"/>
-            <a:ext cx="11430000" cy="1066800"/>
-          </a:xfrm>
-        </p:spPr>
-        <p:txBody>
-          <a:bodyPr/>
-          <a:lstStyle/>
-          <a:p>
-            <a:r>
-              <a:rPr lang="en-US" dirty="0"/>
-              <a:t>How to get started? (Become familiar with DSC)</a:t>
-            </a:r>
-          </a:p>
-        </p:txBody>
-      </p:sp>
-      <p:pic>
-        <p:nvPicPr>
-          <p:cNvPr id="7" name="Picture 6">
-            <a:extLst>
-              <a:ext uri="{FF2B5EF4-FFF2-40B4-BE49-F238E27FC236}">
-                <a16:creationId xmlns:a16="http://schemas.microsoft.com/office/drawing/2014/main" id="{82A14CD9-CCE0-4645-ACCD-D3A74874AF7B}"/>
-              </a:ext>
-            </a:extLst>
-          </p:cNvPr>
-          <p:cNvPicPr>
-            <a:picLocks noChangeAspect="1"/>
-          </p:cNvPicPr>
-          <p:nvPr/>
-        </p:nvPicPr>
-        <p:blipFill>
-          <a:blip r:embed="rId2"/>
-          <a:stretch>
-            <a:fillRect/>
-          </a:stretch>
-        </p:blipFill>
-        <p:spPr>
-          <a:xfrm>
-            <a:off x="655638" y="685800"/>
-            <a:ext cx="11000886" cy="4724400"/>
-          </a:xfrm>
-          <a:prstGeom prst="rect">
-            <a:avLst/>
-          </a:prstGeom>
-        </p:spPr>
-      </p:pic>
-    </p:spTree>
-    <p:extLst>
-      <p:ext uri="{BB962C8B-B14F-4D97-AF65-F5344CB8AC3E}">
-        <p14:creationId xmlns:p14="http://schemas.microsoft.com/office/powerpoint/2010/main" val="3997117863"/>
-      </p:ext>
-    </p:extLst>
-  </p:cSld>
-  <p:clrMapOvr>
-    <a:masterClrMapping/>
-  </p:clrMapOvr>
-  <mc:AlternateContent xmlns:mc="http://schemas.openxmlformats.org/markup-compatibility/2006" xmlns:p14="http://schemas.microsoft.com/office/powerpoint/2010/main">
-    <mc:Choice Requires="p14">
-      <p:transition spd="med" p14:dur="700">
-        <p:fade/>
-      </p:transition>
-    </mc:Choice>
-    <mc:Fallback xmlns="">
-      <p:transition spd="med">
-        <p:fade/>
-      </p:transition>
-    </mc:Fallback>
-  </mc:AlternateContent>
 </p:sld>
 </file>
 
@@ -12096,12 +12254,6 @@
 </file>
 
 <file path=customXml/item2.xml><?xml version="1.0" encoding="utf-8"?>
-<p:properties xmlns:p="http://schemas.microsoft.com/office/2006/metadata/properties" xmlns:xsi="http://www.w3.org/2001/XMLSchema-instance" xmlns:pc="http://schemas.microsoft.com/office/infopath/2007/PartnerControls">
-  <documentManagement/>
-</p:properties>
-</file>
-
-<file path=customXml/item3.xml><?xml version="1.0" encoding="utf-8"?>
 <ct:contentTypeSchema xmlns:ct="http://schemas.microsoft.com/office/2006/metadata/contentType" xmlns:ma="http://schemas.microsoft.com/office/2006/metadata/properties/metaAttributes" ct:_="" ma:_="" ma:contentTypeName="Document" ma:contentTypeID="0x0101004D445A1F0B47A64E8BCB7F600EB772BE" ma:contentTypeVersion="2" ma:contentTypeDescription="Create a new document." ma:contentTypeScope="" ma:versionID="d45b806cb6717f9c292127fec61080d1">
   <xsd:schema xmlns:xsd="http://www.w3.org/2001/XMLSchema" xmlns:xs="http://www.w3.org/2001/XMLSchema" xmlns:p="http://schemas.microsoft.com/office/2006/metadata/properties" xmlns:ns2="3fbeeacb-7a52-4089-9938-2baadc6e1226" targetNamespace="http://schemas.microsoft.com/office/2006/metadata/properties" ma:root="true" ma:fieldsID="09f29b915fa1014edca7bb21cb8975a3" ns2:_="">
     <xsd:import namespace="3fbeeacb-7a52-4089-9938-2baadc6e1226"/>
@@ -12233,6 +12385,12 @@
 </ct:contentTypeSchema>
 </file>
 
+<file path=customXml/item3.xml><?xml version="1.0" encoding="utf-8"?>
+<p:properties xmlns:p="http://schemas.microsoft.com/office/2006/metadata/properties" xmlns:xsi="http://www.w3.org/2001/XMLSchema-instance" xmlns:pc="http://schemas.microsoft.com/office/infopath/2007/PartnerControls">
+  <documentManagement/>
+</p:properties>
+</file>
+
 <file path=customXml/itemProps1.xml><?xml version="1.0" encoding="utf-8"?>
 <ds:datastoreItem xmlns:ds="http://schemas.openxmlformats.org/officeDocument/2006/customXml" ds:itemID="{DB431559-67A3-4293-AAD5-3767E9311634}">
   <ds:schemaRefs>
@@ -12242,15 +12400,6 @@
 </file>
 
 <file path=customXml/itemProps2.xml><?xml version="1.0" encoding="utf-8"?>
-<ds:datastoreItem xmlns:ds="http://schemas.openxmlformats.org/officeDocument/2006/customXml" ds:itemID="{592DF1AA-AD5C-4728-BA5D-8706F2B29210}">
-  <ds:schemaRefs>
-    <ds:schemaRef ds:uri="http://schemas.microsoft.com/office/2006/metadata/properties"/>
-    <ds:schemaRef ds:uri="http://schemas.microsoft.com/office/infopath/2007/PartnerControls"/>
-  </ds:schemaRefs>
-</ds:datastoreItem>
-</file>
-
-<file path=customXml/itemProps3.xml><?xml version="1.0" encoding="utf-8"?>
 <ds:datastoreItem xmlns:ds="http://schemas.openxmlformats.org/officeDocument/2006/customXml" ds:itemID="{E3F500FE-BC19-49E1-9212-06F8B305C0E8}">
   <ds:schemaRefs>
     <ds:schemaRef ds:uri="http://schemas.microsoft.com/office/2006/metadata/contentType"/>
@@ -12266,4 +12415,20 @@
     <ds:schemaRef ds:uri="http://schemas.microsoft.com/internal/obd"/>
   </ds:schemaRefs>
 </ds:datastoreItem>
+</file>
+
+<file path=customXml/itemProps3.xml><?xml version="1.0" encoding="utf-8"?>
+<ds:datastoreItem xmlns:ds="http://schemas.openxmlformats.org/officeDocument/2006/customXml" ds:itemID="{592DF1AA-AD5C-4728-BA5D-8706F2B29210}">
+  <ds:schemaRefs>
+    <ds:schemaRef ds:uri="http://purl.org/dc/terms/"/>
+    <ds:schemaRef ds:uri="http://purl.org/dc/elements/1.1/"/>
+    <ds:schemaRef ds:uri="http://www.w3.org/XML/1998/namespace"/>
+    <ds:schemaRef ds:uri="http://schemas.microsoft.com/office/2006/documentManagement/types"/>
+    <ds:schemaRef ds:uri="http://schemas.openxmlformats.org/package/2006/metadata/core-properties"/>
+    <ds:schemaRef ds:uri="http://schemas.microsoft.com/office/infopath/2007/PartnerControls"/>
+    <ds:schemaRef ds:uri="3fbeeacb-7a52-4089-9938-2baadc6e1226"/>
+    <ds:schemaRef ds:uri="http://schemas.microsoft.com/office/2006/metadata/properties"/>
+    <ds:schemaRef ds:uri="http://purl.org/dc/dcmitype/"/>
+  </ds:schemaRefs>
+</ds:datastoreItem>
 </file>
</xml_diff>